<commit_message>
up to 12 days
</commit_message>
<xml_diff>
--- a/docs/master.pptx
+++ b/docs/master.pptx
@@ -8,9 +8,7 @@
     <p:sldId id="256" r:id="rId2"/>
     <p:sldId id="257" r:id="rId3"/>
     <p:sldId id="258" r:id="rId4"/>
-    <p:sldId id="262" r:id="rId5"/>
-    <p:sldId id="263" r:id="rId6"/>
-    <p:sldId id="261" r:id="rId7"/>
+    <p:sldId id="261" r:id="rId5"/>
   </p:sldIdLst>
   <p:sldSz cx="12192000" cy="6858000"/>
   <p:notesSz cx="6858000" cy="9144000"/>
@@ -264,7 +262,7 @@
           <a:p>
             <a:fld id="{28C2B288-BBB8-4C3E-AE6B-7F0B96267D8D}" type="datetimeFigureOut">
               <a:rPr lang="en-US" smtClean="0"/>
-              <a:t>22-May-22</a:t>
+              <a:t>31-May-22</a:t>
             </a:fld>
             <a:endParaRPr lang="en-US"/>
           </a:p>
@@ -462,7 +460,7 @@
           <a:p>
             <a:fld id="{28C2B288-BBB8-4C3E-AE6B-7F0B96267D8D}" type="datetimeFigureOut">
               <a:rPr lang="en-US" smtClean="0"/>
-              <a:t>22-May-22</a:t>
+              <a:t>31-May-22</a:t>
             </a:fld>
             <a:endParaRPr lang="en-US"/>
           </a:p>
@@ -670,7 +668,7 @@
           <a:p>
             <a:fld id="{28C2B288-BBB8-4C3E-AE6B-7F0B96267D8D}" type="datetimeFigureOut">
               <a:rPr lang="en-US" smtClean="0"/>
-              <a:t>22-May-22</a:t>
+              <a:t>31-May-22</a:t>
             </a:fld>
             <a:endParaRPr lang="en-US"/>
           </a:p>
@@ -868,7 +866,7 @@
           <a:p>
             <a:fld id="{28C2B288-BBB8-4C3E-AE6B-7F0B96267D8D}" type="datetimeFigureOut">
               <a:rPr lang="en-US" smtClean="0"/>
-              <a:t>22-May-22</a:t>
+              <a:t>31-May-22</a:t>
             </a:fld>
             <a:endParaRPr lang="en-US"/>
           </a:p>
@@ -1143,7 +1141,7 @@
           <a:p>
             <a:fld id="{28C2B288-BBB8-4C3E-AE6B-7F0B96267D8D}" type="datetimeFigureOut">
               <a:rPr lang="en-US" smtClean="0"/>
-              <a:t>22-May-22</a:t>
+              <a:t>31-May-22</a:t>
             </a:fld>
             <a:endParaRPr lang="en-US"/>
           </a:p>
@@ -1408,7 +1406,7 @@
           <a:p>
             <a:fld id="{28C2B288-BBB8-4C3E-AE6B-7F0B96267D8D}" type="datetimeFigureOut">
               <a:rPr lang="en-US" smtClean="0"/>
-              <a:t>22-May-22</a:t>
+              <a:t>31-May-22</a:t>
             </a:fld>
             <a:endParaRPr lang="en-US"/>
           </a:p>
@@ -1820,7 +1818,7 @@
           <a:p>
             <a:fld id="{28C2B288-BBB8-4C3E-AE6B-7F0B96267D8D}" type="datetimeFigureOut">
               <a:rPr lang="en-US" smtClean="0"/>
-              <a:t>22-May-22</a:t>
+              <a:t>31-May-22</a:t>
             </a:fld>
             <a:endParaRPr lang="en-US"/>
           </a:p>
@@ -1961,7 +1959,7 @@
           <a:p>
             <a:fld id="{28C2B288-BBB8-4C3E-AE6B-7F0B96267D8D}" type="datetimeFigureOut">
               <a:rPr lang="en-US" smtClean="0"/>
-              <a:t>22-May-22</a:t>
+              <a:t>31-May-22</a:t>
             </a:fld>
             <a:endParaRPr lang="en-US"/>
           </a:p>
@@ -2074,7 +2072,7 @@
           <a:p>
             <a:fld id="{28C2B288-BBB8-4C3E-AE6B-7F0B96267D8D}" type="datetimeFigureOut">
               <a:rPr lang="en-US" smtClean="0"/>
-              <a:t>22-May-22</a:t>
+              <a:t>31-May-22</a:t>
             </a:fld>
             <a:endParaRPr lang="en-US"/>
           </a:p>
@@ -2385,7 +2383,7 @@
           <a:p>
             <a:fld id="{28C2B288-BBB8-4C3E-AE6B-7F0B96267D8D}" type="datetimeFigureOut">
               <a:rPr lang="en-US" smtClean="0"/>
-              <a:t>22-May-22</a:t>
+              <a:t>31-May-22</a:t>
             </a:fld>
             <a:endParaRPr lang="en-US"/>
           </a:p>
@@ -2673,7 +2671,7 @@
           <a:p>
             <a:fld id="{28C2B288-BBB8-4C3E-AE6B-7F0B96267D8D}" type="datetimeFigureOut">
               <a:rPr lang="en-US" smtClean="0"/>
-              <a:t>22-May-22</a:t>
+              <a:t>31-May-22</a:t>
             </a:fld>
             <a:endParaRPr lang="en-US"/>
           </a:p>
@@ -2914,7 +2912,7 @@
           <a:p>
             <a:fld id="{28C2B288-BBB8-4C3E-AE6B-7F0B96267D8D}" type="datetimeFigureOut">
               <a:rPr lang="en-US" smtClean="0"/>
-              <a:t>22-May-22</a:t>
+              <a:t>31-May-22</a:t>
             </a:fld>
             <a:endParaRPr lang="en-US"/>
           </a:p>
@@ -3339,12 +3337,12 @@
           <a:chExt cx="0" cy="0"/>
         </a:xfrm>
       </p:grpSpPr>
-      <p:sp>
-        <p:nvSpPr>
-          <p:cNvPr id="14" name="Rectangle 8">
-            <a:extLst>
-              <a:ext uri="{FF2B5EF4-FFF2-40B4-BE49-F238E27FC236}">
-                <a16:creationId xmlns:a16="http://schemas.microsoft.com/office/drawing/2014/main" id="{F3060C83-F051-4F0E-ABAD-AA0DFC48B218}"/>
+      <p:sp useBgFill="1">
+        <p:nvSpPr>
+          <p:cNvPr id="37" name="Rectangle 36">
+            <a:extLst>
+              <a:ext uri="{FF2B5EF4-FFF2-40B4-BE49-F238E27FC236}">
+                <a16:creationId xmlns:a16="http://schemas.microsoft.com/office/drawing/2014/main" id="{2D2B266D-3625-4584-A5C3-7D3F672CFF30}"/>
               </a:ext>
               <a:ext uri="{C183D7F6-B498-43B3-948B-1728B52AA6E4}">
                 <adec:decorative xmlns:adec="http://schemas.microsoft.com/office/drawing/2017/decorative" val="1"/>
@@ -3365,13 +3363,615 @@
         <p:spPr>
           <a:xfrm>
             <a:off x="0" y="0"/>
-            <a:ext cx="12192000" cy="6858000"/>
+            <a:ext cx="12188952" cy="6858000"/>
           </a:xfrm>
           <a:prstGeom prst="rect">
             <a:avLst/>
           </a:prstGeom>
+          <a:ln>
+            <a:noFill/>
+          </a:ln>
+        </p:spPr>
+        <p:style>
+          <a:lnRef idx="2">
+            <a:schemeClr val="accent1">
+              <a:shade val="50000"/>
+            </a:schemeClr>
+          </a:lnRef>
+          <a:fillRef idx="1">
+            <a:schemeClr val="accent1"/>
+          </a:fillRef>
+          <a:effectRef idx="0">
+            <a:schemeClr val="accent1"/>
+          </a:effectRef>
+          <a:fontRef idx="minor">
+            <a:schemeClr val="lt1"/>
+          </a:fontRef>
+        </p:style>
+        <p:txBody>
+          <a:bodyPr rtlCol="0" anchor="ctr"/>
+          <a:lstStyle/>
+          <a:p>
+            <a:pPr algn="ctr"/>
+            <a:endParaRPr lang="en-US"/>
+          </a:p>
+        </p:txBody>
+      </p:sp>
+      <p:sp>
+        <p:nvSpPr>
+          <p:cNvPr id="39" name="Freeform: Shape 38">
+            <a:extLst>
+              <a:ext uri="{FF2B5EF4-FFF2-40B4-BE49-F238E27FC236}">
+                <a16:creationId xmlns:a16="http://schemas.microsoft.com/office/drawing/2014/main" id="{A5D2A5D1-BA0D-47D3-B051-DA7743C46E28}"/>
+              </a:ext>
+              <a:ext uri="{C183D7F6-B498-43B3-948B-1728B52AA6E4}">
+                <adec:decorative xmlns:adec="http://schemas.microsoft.com/office/drawing/2017/decorative" val="1"/>
+              </a:ext>
+            </a:extLst>
+          </p:cNvPr>
+          <p:cNvSpPr>
+            <a:spLocks noGrp="1" noRot="1" noChangeAspect="1" noMove="1" noResize="1" noEditPoints="1" noAdjustHandles="1" noChangeArrowheads="1" noChangeShapeType="1" noTextEdit="1"/>
+          </p:cNvSpPr>
+          <p:nvPr>
+            <p:extLst>
+              <p:ext uri="{386F3935-93C4-4BCD-93E2-E3B085C9AB24}">
+                <p16:designElem xmlns:p16="http://schemas.microsoft.com/office/powerpoint/2015/main" val="1"/>
+              </p:ext>
+            </p:extLst>
+          </p:nvPr>
+        </p:nvSpPr>
+        <p:spPr>
+          <a:xfrm>
+            <a:off x="0" y="0"/>
+            <a:ext cx="12192000" cy="6219825"/>
+          </a:xfrm>
+          <a:custGeom>
+            <a:avLst/>
+            <a:gdLst>
+              <a:gd name="connsiteX0" fmla="*/ 6789701 w 12192000"/>
+              <a:gd name="connsiteY0" fmla="*/ 6151588 h 6219825"/>
+              <a:gd name="connsiteX1" fmla="*/ 6788702 w 12192000"/>
+              <a:gd name="connsiteY1" fmla="*/ 6151666 h 6219825"/>
+              <a:gd name="connsiteX2" fmla="*/ 6788476 w 12192000"/>
+              <a:gd name="connsiteY2" fmla="*/ 6152200 h 6219825"/>
+              <a:gd name="connsiteX3" fmla="*/ 9834 w 12192000"/>
+              <a:gd name="connsiteY3" fmla="*/ 0 h 6219825"/>
+              <a:gd name="connsiteX4" fmla="*/ 12357 w 12192000"/>
+              <a:gd name="connsiteY4" fmla="*/ 1 h 6219825"/>
+              <a:gd name="connsiteX5" fmla="*/ 12192000 w 12192000"/>
+              <a:gd name="connsiteY5" fmla="*/ 1 h 6219825"/>
+              <a:gd name="connsiteX6" fmla="*/ 12192000 w 12192000"/>
+              <a:gd name="connsiteY6" fmla="*/ 5105401 h 6219825"/>
+              <a:gd name="connsiteX7" fmla="*/ 12191716 w 12192000"/>
+              <a:gd name="connsiteY7" fmla="*/ 5105401 h 6219825"/>
+              <a:gd name="connsiteX8" fmla="*/ 12192000 w 12192000"/>
+              <a:gd name="connsiteY8" fmla="*/ 5256977 h 6219825"/>
+              <a:gd name="connsiteX9" fmla="*/ 12061096 w 12192000"/>
+              <a:gd name="connsiteY9" fmla="*/ 5296034 h 6219825"/>
+              <a:gd name="connsiteX10" fmla="*/ 11676800 w 12192000"/>
+              <a:gd name="connsiteY10" fmla="*/ 5399652 h 6219825"/>
+              <a:gd name="connsiteX11" fmla="*/ 10425355 w 12192000"/>
+              <a:gd name="connsiteY11" fmla="*/ 5683310 h 6219825"/>
+              <a:gd name="connsiteX12" fmla="*/ 9424022 w 12192000"/>
+              <a:gd name="connsiteY12" fmla="*/ 5858546 h 6219825"/>
+              <a:gd name="connsiteX13" fmla="*/ 8458419 w 12192000"/>
+              <a:gd name="connsiteY13" fmla="*/ 5992303 h 6219825"/>
+              <a:gd name="connsiteX14" fmla="*/ 7715970 w 12192000"/>
+              <a:gd name="connsiteY14" fmla="*/ 6072283 h 6219825"/>
+              <a:gd name="connsiteX15" fmla="*/ 6951716 w 12192000"/>
+              <a:gd name="connsiteY15" fmla="*/ 6138091 h 6219825"/>
+              <a:gd name="connsiteX16" fmla="*/ 6936303 w 12192000"/>
+              <a:gd name="connsiteY16" fmla="*/ 6140163 h 6219825"/>
+              <a:gd name="connsiteX17" fmla="*/ 6790448 w 12192000"/>
+              <a:gd name="connsiteY17" fmla="*/ 6151529 h 6219825"/>
+              <a:gd name="connsiteX18" fmla="*/ 6799941 w 12192000"/>
+              <a:gd name="connsiteY18" fmla="*/ 6153349 h 6219825"/>
+              <a:gd name="connsiteX19" fmla="*/ 6835432 w 12192000"/>
+              <a:gd name="connsiteY19" fmla="*/ 6151642 h 6219825"/>
+              <a:gd name="connsiteX20" fmla="*/ 6884003 w 12192000"/>
+              <a:gd name="connsiteY20" fmla="*/ 6148662 h 6219825"/>
+              <a:gd name="connsiteX21" fmla="*/ 7578771 w 12192000"/>
+              <a:gd name="connsiteY21" fmla="*/ 6116122 h 6219825"/>
+              <a:gd name="connsiteX22" fmla="*/ 8623845 w 12192000"/>
+              <a:gd name="connsiteY22" fmla="*/ 6029188 h 6219825"/>
+              <a:gd name="connsiteX23" fmla="*/ 9479970 w 12192000"/>
+              <a:gd name="connsiteY23" fmla="*/ 5925239 h 6219825"/>
+              <a:gd name="connsiteX24" fmla="*/ 10629308 w 12192000"/>
+              <a:gd name="connsiteY24" fmla="*/ 5731000 h 6219825"/>
+              <a:gd name="connsiteX25" fmla="*/ 11998498 w 12192000"/>
+              <a:gd name="connsiteY25" fmla="*/ 5404869 h 6219825"/>
+              <a:gd name="connsiteX26" fmla="*/ 12192000 w 12192000"/>
+              <a:gd name="connsiteY26" fmla="*/ 5347846 h 6219825"/>
+              <a:gd name="connsiteX27" fmla="*/ 12192000 w 12192000"/>
+              <a:gd name="connsiteY27" fmla="*/ 5402606 h 6219825"/>
+              <a:gd name="connsiteX28" fmla="*/ 11829257 w 12192000"/>
+              <a:gd name="connsiteY28" fmla="*/ 5507950 h 6219825"/>
+              <a:gd name="connsiteX29" fmla="*/ 10939183 w 12192000"/>
+              <a:gd name="connsiteY29" fmla="*/ 5722555 h 6219825"/>
+              <a:gd name="connsiteX30" fmla="*/ 9985530 w 12192000"/>
+              <a:gd name="connsiteY30" fmla="*/ 5902635 h 6219825"/>
+              <a:gd name="connsiteX31" fmla="*/ 9186882 w 12192000"/>
+              <a:gd name="connsiteY31" fmla="*/ 6018631 h 6219825"/>
+              <a:gd name="connsiteX32" fmla="*/ 8578198 w 12192000"/>
+              <a:gd name="connsiteY32" fmla="*/ 6088179 h 6219825"/>
+              <a:gd name="connsiteX33" fmla="*/ 7864358 w 12192000"/>
+              <a:gd name="connsiteY33" fmla="*/ 6149656 h 6219825"/>
+              <a:gd name="connsiteX34" fmla="*/ 6935502 w 12192000"/>
+              <a:gd name="connsiteY34" fmla="*/ 6201071 h 6219825"/>
+              <a:gd name="connsiteX35" fmla="*/ 6477750 w 12192000"/>
+              <a:gd name="connsiteY35" fmla="*/ 6214980 h 6219825"/>
+              <a:gd name="connsiteX36" fmla="*/ 6362294 w 12192000"/>
+              <a:gd name="connsiteY36" fmla="*/ 6219825 h 6219825"/>
+              <a:gd name="connsiteX37" fmla="*/ 6057129 w 12192000"/>
+              <a:gd name="connsiteY37" fmla="*/ 6219825 h 6219825"/>
+              <a:gd name="connsiteX38" fmla="*/ 5977784 w 12192000"/>
+              <a:gd name="connsiteY38" fmla="*/ 6215229 h 6219825"/>
+              <a:gd name="connsiteX39" fmla="*/ 5265087 w 12192000"/>
+              <a:gd name="connsiteY39" fmla="*/ 6178965 h 6219825"/>
+              <a:gd name="connsiteX40" fmla="*/ 4346277 w 12192000"/>
+              <a:gd name="connsiteY40" fmla="*/ 6116869 h 6219825"/>
+              <a:gd name="connsiteX41" fmla="*/ 3373045 w 12192000"/>
+              <a:gd name="connsiteY41" fmla="*/ 6018259 h 6219825"/>
+              <a:gd name="connsiteX42" fmla="*/ 2362173 w 12192000"/>
+              <a:gd name="connsiteY42" fmla="*/ 5899282 h 6219825"/>
+              <a:gd name="connsiteX43" fmla="*/ 1233178 w 12192000"/>
+              <a:gd name="connsiteY43" fmla="*/ 5726033 h 6219825"/>
+              <a:gd name="connsiteX44" fmla="*/ 68500 w 12192000"/>
+              <a:gd name="connsiteY44" fmla="*/ 5486226 h 6219825"/>
+              <a:gd name="connsiteX45" fmla="*/ 0 w 12192000"/>
+              <a:gd name="connsiteY45" fmla="*/ 5468863 h 6219825"/>
+              <a:gd name="connsiteX46" fmla="*/ 0 w 12192000"/>
+              <a:gd name="connsiteY46" fmla="*/ 5412351 h 6219825"/>
+              <a:gd name="connsiteX47" fmla="*/ 72441 w 12192000"/>
+              <a:gd name="connsiteY47" fmla="*/ 5431135 h 6219825"/>
+              <a:gd name="connsiteX48" fmla="*/ 600716 w 12192000"/>
+              <a:gd name="connsiteY48" fmla="*/ 5549555 h 6219825"/>
+              <a:gd name="connsiteX49" fmla="*/ 1769512 w 12192000"/>
+              <a:gd name="connsiteY49" fmla="*/ 5759811 h 6219825"/>
+              <a:gd name="connsiteX50" fmla="*/ 2613554 w 12192000"/>
+              <a:gd name="connsiteY50" fmla="*/ 5876802 h 6219825"/>
+              <a:gd name="connsiteX51" fmla="*/ 2581134 w 12192000"/>
+              <a:gd name="connsiteY51" fmla="*/ 5866867 h 6219825"/>
+              <a:gd name="connsiteX52" fmla="*/ 1112635 w 12192000"/>
+              <a:gd name="connsiteY52" fmla="*/ 5534031 h 6219825"/>
+              <a:gd name="connsiteX53" fmla="*/ 420412 w 12192000"/>
+              <a:gd name="connsiteY53" fmla="*/ 5334514 h 6219825"/>
+              <a:gd name="connsiteX54" fmla="*/ 0 w 12192000"/>
+              <a:gd name="connsiteY54" fmla="*/ 5195539 h 6219825"/>
+              <a:gd name="connsiteX55" fmla="*/ 60 w 12192000"/>
+              <a:gd name="connsiteY55" fmla="*/ 5105401 h 6219825"/>
+              <a:gd name="connsiteX56" fmla="*/ 0 w 12192000"/>
+              <a:gd name="connsiteY56" fmla="*/ 5105401 h 6219825"/>
+              <a:gd name="connsiteX57" fmla="*/ 0 w 12192000"/>
+              <a:gd name="connsiteY57" fmla="*/ 1 h 6219825"/>
+              <a:gd name="connsiteX58" fmla="*/ 9834 w 12192000"/>
+              <a:gd name="connsiteY58" fmla="*/ 1 h 6219825"/>
+            </a:gdLst>
+            <a:ahLst/>
+            <a:cxnLst>
+              <a:cxn ang="0">
+                <a:pos x="connsiteX0" y="connsiteY0"/>
+              </a:cxn>
+              <a:cxn ang="0">
+                <a:pos x="connsiteX1" y="connsiteY1"/>
+              </a:cxn>
+              <a:cxn ang="0">
+                <a:pos x="connsiteX2" y="connsiteY2"/>
+              </a:cxn>
+              <a:cxn ang="0">
+                <a:pos x="connsiteX3" y="connsiteY3"/>
+              </a:cxn>
+              <a:cxn ang="0">
+                <a:pos x="connsiteX4" y="connsiteY4"/>
+              </a:cxn>
+              <a:cxn ang="0">
+                <a:pos x="connsiteX5" y="connsiteY5"/>
+              </a:cxn>
+              <a:cxn ang="0">
+                <a:pos x="connsiteX6" y="connsiteY6"/>
+              </a:cxn>
+              <a:cxn ang="0">
+                <a:pos x="connsiteX7" y="connsiteY7"/>
+              </a:cxn>
+              <a:cxn ang="0">
+                <a:pos x="connsiteX8" y="connsiteY8"/>
+              </a:cxn>
+              <a:cxn ang="0">
+                <a:pos x="connsiteX9" y="connsiteY9"/>
+              </a:cxn>
+              <a:cxn ang="0">
+                <a:pos x="connsiteX10" y="connsiteY10"/>
+              </a:cxn>
+              <a:cxn ang="0">
+                <a:pos x="connsiteX11" y="connsiteY11"/>
+              </a:cxn>
+              <a:cxn ang="0">
+                <a:pos x="connsiteX12" y="connsiteY12"/>
+              </a:cxn>
+              <a:cxn ang="0">
+                <a:pos x="connsiteX13" y="connsiteY13"/>
+              </a:cxn>
+              <a:cxn ang="0">
+                <a:pos x="connsiteX14" y="connsiteY14"/>
+              </a:cxn>
+              <a:cxn ang="0">
+                <a:pos x="connsiteX15" y="connsiteY15"/>
+              </a:cxn>
+              <a:cxn ang="0">
+                <a:pos x="connsiteX16" y="connsiteY16"/>
+              </a:cxn>
+              <a:cxn ang="0">
+                <a:pos x="connsiteX17" y="connsiteY17"/>
+              </a:cxn>
+              <a:cxn ang="0">
+                <a:pos x="connsiteX18" y="connsiteY18"/>
+              </a:cxn>
+              <a:cxn ang="0">
+                <a:pos x="connsiteX19" y="connsiteY19"/>
+              </a:cxn>
+              <a:cxn ang="0">
+                <a:pos x="connsiteX20" y="connsiteY20"/>
+              </a:cxn>
+              <a:cxn ang="0">
+                <a:pos x="connsiteX21" y="connsiteY21"/>
+              </a:cxn>
+              <a:cxn ang="0">
+                <a:pos x="connsiteX22" y="connsiteY22"/>
+              </a:cxn>
+              <a:cxn ang="0">
+                <a:pos x="connsiteX23" y="connsiteY23"/>
+              </a:cxn>
+              <a:cxn ang="0">
+                <a:pos x="connsiteX24" y="connsiteY24"/>
+              </a:cxn>
+              <a:cxn ang="0">
+                <a:pos x="connsiteX25" y="connsiteY25"/>
+              </a:cxn>
+              <a:cxn ang="0">
+                <a:pos x="connsiteX26" y="connsiteY26"/>
+              </a:cxn>
+              <a:cxn ang="0">
+                <a:pos x="connsiteX27" y="connsiteY27"/>
+              </a:cxn>
+              <a:cxn ang="0">
+                <a:pos x="connsiteX28" y="connsiteY28"/>
+              </a:cxn>
+              <a:cxn ang="0">
+                <a:pos x="connsiteX29" y="connsiteY29"/>
+              </a:cxn>
+              <a:cxn ang="0">
+                <a:pos x="connsiteX30" y="connsiteY30"/>
+              </a:cxn>
+              <a:cxn ang="0">
+                <a:pos x="connsiteX31" y="connsiteY31"/>
+              </a:cxn>
+              <a:cxn ang="0">
+                <a:pos x="connsiteX32" y="connsiteY32"/>
+              </a:cxn>
+              <a:cxn ang="0">
+                <a:pos x="connsiteX33" y="connsiteY33"/>
+              </a:cxn>
+              <a:cxn ang="0">
+                <a:pos x="connsiteX34" y="connsiteY34"/>
+              </a:cxn>
+              <a:cxn ang="0">
+                <a:pos x="connsiteX35" y="connsiteY35"/>
+              </a:cxn>
+              <a:cxn ang="0">
+                <a:pos x="connsiteX36" y="connsiteY36"/>
+              </a:cxn>
+              <a:cxn ang="0">
+                <a:pos x="connsiteX37" y="connsiteY37"/>
+              </a:cxn>
+              <a:cxn ang="0">
+                <a:pos x="connsiteX38" y="connsiteY38"/>
+              </a:cxn>
+              <a:cxn ang="0">
+                <a:pos x="connsiteX39" y="connsiteY39"/>
+              </a:cxn>
+              <a:cxn ang="0">
+                <a:pos x="connsiteX40" y="connsiteY40"/>
+              </a:cxn>
+              <a:cxn ang="0">
+                <a:pos x="connsiteX41" y="connsiteY41"/>
+              </a:cxn>
+              <a:cxn ang="0">
+                <a:pos x="connsiteX42" y="connsiteY42"/>
+              </a:cxn>
+              <a:cxn ang="0">
+                <a:pos x="connsiteX43" y="connsiteY43"/>
+              </a:cxn>
+              <a:cxn ang="0">
+                <a:pos x="connsiteX44" y="connsiteY44"/>
+              </a:cxn>
+              <a:cxn ang="0">
+                <a:pos x="connsiteX45" y="connsiteY45"/>
+              </a:cxn>
+              <a:cxn ang="0">
+                <a:pos x="connsiteX46" y="connsiteY46"/>
+              </a:cxn>
+              <a:cxn ang="0">
+                <a:pos x="connsiteX47" y="connsiteY47"/>
+              </a:cxn>
+              <a:cxn ang="0">
+                <a:pos x="connsiteX48" y="connsiteY48"/>
+              </a:cxn>
+              <a:cxn ang="0">
+                <a:pos x="connsiteX49" y="connsiteY49"/>
+              </a:cxn>
+              <a:cxn ang="0">
+                <a:pos x="connsiteX50" y="connsiteY50"/>
+              </a:cxn>
+              <a:cxn ang="0">
+                <a:pos x="connsiteX51" y="connsiteY51"/>
+              </a:cxn>
+              <a:cxn ang="0">
+                <a:pos x="connsiteX52" y="connsiteY52"/>
+              </a:cxn>
+              <a:cxn ang="0">
+                <a:pos x="connsiteX53" y="connsiteY53"/>
+              </a:cxn>
+              <a:cxn ang="0">
+                <a:pos x="connsiteX54" y="connsiteY54"/>
+              </a:cxn>
+              <a:cxn ang="0">
+                <a:pos x="connsiteX55" y="connsiteY55"/>
+              </a:cxn>
+              <a:cxn ang="0">
+                <a:pos x="connsiteX56" y="connsiteY56"/>
+              </a:cxn>
+              <a:cxn ang="0">
+                <a:pos x="connsiteX57" y="connsiteY57"/>
+              </a:cxn>
+              <a:cxn ang="0">
+                <a:pos x="connsiteX58" y="connsiteY58"/>
+              </a:cxn>
+            </a:cxnLst>
+            <a:rect l="l" t="t" r="r" b="b"/>
+            <a:pathLst>
+              <a:path w="12192000" h="6219825">
+                <a:moveTo>
+                  <a:pt x="6789701" y="6151588"/>
+                </a:moveTo>
+                <a:lnTo>
+                  <a:pt x="6788702" y="6151666"/>
+                </a:lnTo>
+                <a:cubicBezTo>
+                  <a:pt x="6788627" y="6151844"/>
+                  <a:pt x="6788551" y="6152022"/>
+                  <a:pt x="6788476" y="6152200"/>
+                </a:cubicBezTo>
+                <a:close/>
+                <a:moveTo>
+                  <a:pt x="9834" y="0"/>
+                </a:moveTo>
+                <a:lnTo>
+                  <a:pt x="12357" y="1"/>
+                </a:lnTo>
+                <a:lnTo>
+                  <a:pt x="12192000" y="1"/>
+                </a:lnTo>
+                <a:lnTo>
+                  <a:pt x="12192000" y="5105401"/>
+                </a:lnTo>
+                <a:lnTo>
+                  <a:pt x="12191716" y="5105401"/>
+                </a:lnTo>
+                <a:lnTo>
+                  <a:pt x="12192000" y="5256977"/>
+                </a:lnTo>
+                <a:lnTo>
+                  <a:pt x="12061096" y="5296034"/>
+                </a:lnTo>
+                <a:cubicBezTo>
+                  <a:pt x="11933500" y="5332263"/>
+                  <a:pt x="11805390" y="5366806"/>
+                  <a:pt x="11676800" y="5399652"/>
+                </a:cubicBezTo>
+                <a:cubicBezTo>
+                  <a:pt x="11262789" y="5507204"/>
+                  <a:pt x="10845343" y="5600846"/>
+                  <a:pt x="10425355" y="5683310"/>
+                </a:cubicBezTo>
+                <a:cubicBezTo>
+                  <a:pt x="10092810" y="5748549"/>
+                  <a:pt x="9759033" y="5806970"/>
+                  <a:pt x="9424022" y="5858546"/>
+                </a:cubicBezTo>
+                <a:cubicBezTo>
+                  <a:pt x="9102997" y="5908224"/>
+                  <a:pt x="8781133" y="5952809"/>
+                  <a:pt x="8458419" y="5992303"/>
+                </a:cubicBezTo>
+                <a:cubicBezTo>
+                  <a:pt x="8211360" y="6022481"/>
+                  <a:pt x="7963792" y="6048065"/>
+                  <a:pt x="7715970" y="6072283"/>
+                </a:cubicBezTo>
+                <a:lnTo>
+                  <a:pt x="6951716" y="6138091"/>
+                </a:lnTo>
+                <a:lnTo>
+                  <a:pt x="6936303" y="6140163"/>
+                </a:lnTo>
+                <a:lnTo>
+                  <a:pt x="6790448" y="6151529"/>
+                </a:lnTo>
+                <a:lnTo>
+                  <a:pt x="6799941" y="6153349"/>
+                </a:lnTo>
+                <a:cubicBezTo>
+                  <a:pt x="6811623" y="6153816"/>
+                  <a:pt x="6823734" y="6151642"/>
+                  <a:pt x="6835432" y="6151642"/>
+                </a:cubicBezTo>
+                <a:cubicBezTo>
+                  <a:pt x="6851580" y="6151642"/>
+                  <a:pt x="6867729" y="6149034"/>
+                  <a:pt x="6884003" y="6148662"/>
+                </a:cubicBezTo>
+                <a:cubicBezTo>
+                  <a:pt x="7115805" y="6143198"/>
+                  <a:pt x="7347351" y="6131026"/>
+                  <a:pt x="7578771" y="6116122"/>
+                </a:cubicBezTo>
+                <a:cubicBezTo>
+                  <a:pt x="7927552" y="6093644"/>
+                  <a:pt x="8276080" y="6065453"/>
+                  <a:pt x="8623845" y="6029188"/>
+                </a:cubicBezTo>
+                <a:cubicBezTo>
+                  <a:pt x="8909939" y="5999878"/>
+                  <a:pt x="9195310" y="5965228"/>
+                  <a:pt x="9479970" y="5925239"/>
+                </a:cubicBezTo>
+                <a:cubicBezTo>
+                  <a:pt x="9864901" y="5870842"/>
+                  <a:pt x="10248014" y="5806101"/>
+                  <a:pt x="10629308" y="5731000"/>
+                </a:cubicBezTo>
+                <a:cubicBezTo>
+                  <a:pt x="11090114" y="5639842"/>
+                  <a:pt x="11546975" y="5532291"/>
+                  <a:pt x="11998498" y="5404869"/>
+                </a:cubicBezTo>
+                <a:lnTo>
+                  <a:pt x="12192000" y="5347846"/>
+                </a:lnTo>
+                <a:lnTo>
+                  <a:pt x="12192000" y="5402606"/>
+                </a:lnTo>
+                <a:lnTo>
+                  <a:pt x="11829257" y="5507950"/>
+                </a:lnTo>
+                <a:cubicBezTo>
+                  <a:pt x="11534769" y="5587680"/>
+                  <a:pt x="11238120" y="5658596"/>
+                  <a:pt x="10939183" y="5722555"/>
+                </a:cubicBezTo>
+                <a:cubicBezTo>
+                  <a:pt x="10622824" y="5790365"/>
+                  <a:pt x="10304941" y="5850387"/>
+                  <a:pt x="9985530" y="5902635"/>
+                </a:cubicBezTo>
+                <a:cubicBezTo>
+                  <a:pt x="9720036" y="5946102"/>
+                  <a:pt x="9453814" y="5984764"/>
+                  <a:pt x="9186882" y="6018631"/>
+                </a:cubicBezTo>
+                <a:cubicBezTo>
+                  <a:pt x="8984197" y="6044216"/>
+                  <a:pt x="8781514" y="6068309"/>
+                  <a:pt x="8578198" y="6088179"/>
+                </a:cubicBezTo>
+                <a:lnTo>
+                  <a:pt x="7864358" y="6149656"/>
+                </a:lnTo>
+                <a:cubicBezTo>
+                  <a:pt x="7554994" y="6172009"/>
+                  <a:pt x="7245502" y="6189895"/>
+                  <a:pt x="6935502" y="6201071"/>
+                </a:cubicBezTo>
+                <a:lnTo>
+                  <a:pt x="6477750" y="6214980"/>
+                </a:lnTo>
+                <a:cubicBezTo>
+                  <a:pt x="6439195" y="6212895"/>
+                  <a:pt x="6400529" y="6214521"/>
+                  <a:pt x="6362294" y="6219825"/>
+                </a:cubicBezTo>
+                <a:lnTo>
+                  <a:pt x="6057129" y="6219825"/>
+                </a:lnTo>
+                <a:lnTo>
+                  <a:pt x="5977784" y="6215229"/>
+                </a:lnTo>
+                <a:lnTo>
+                  <a:pt x="5265087" y="6178965"/>
+                </a:lnTo>
+                <a:cubicBezTo>
+                  <a:pt x="4958267" y="6166544"/>
+                  <a:pt x="4651826" y="6146055"/>
+                  <a:pt x="4346277" y="6116869"/>
+                </a:cubicBezTo>
+                <a:lnTo>
+                  <a:pt x="3373045" y="6018259"/>
+                </a:lnTo>
+                <a:cubicBezTo>
+                  <a:pt x="3035412" y="5983982"/>
+                  <a:pt x="2698456" y="5944327"/>
+                  <a:pt x="2362173" y="5899282"/>
+                </a:cubicBezTo>
+                <a:cubicBezTo>
+                  <a:pt x="1984692" y="5849108"/>
+                  <a:pt x="1608364" y="5791358"/>
+                  <a:pt x="1233178" y="5726033"/>
+                </a:cubicBezTo>
+                <a:cubicBezTo>
+                  <a:pt x="842181" y="5657291"/>
+                  <a:pt x="453758" y="5578770"/>
+                  <a:pt x="68500" y="5486226"/>
+                </a:cubicBezTo>
+                <a:lnTo>
+                  <a:pt x="0" y="5468863"/>
+                </a:lnTo>
+                <a:lnTo>
+                  <a:pt x="0" y="5412351"/>
+                </a:lnTo>
+                <a:lnTo>
+                  <a:pt x="72441" y="5431135"/>
+                </a:lnTo>
+                <a:cubicBezTo>
+                  <a:pt x="247961" y="5473331"/>
+                  <a:pt x="424164" y="5512608"/>
+                  <a:pt x="600716" y="5549555"/>
+                </a:cubicBezTo>
+                <a:cubicBezTo>
+                  <a:pt x="988279" y="5630403"/>
+                  <a:pt x="1378133" y="5699330"/>
+                  <a:pt x="1769512" y="5759811"/>
+                </a:cubicBezTo>
+                <a:cubicBezTo>
+                  <a:pt x="2052426" y="5803406"/>
+                  <a:pt x="2335725" y="5843519"/>
+                  <a:pt x="2613554" y="5876802"/>
+                </a:cubicBezTo>
+                <a:cubicBezTo>
+                  <a:pt x="2605544" y="5879410"/>
+                  <a:pt x="2594611" y="5869350"/>
+                  <a:pt x="2581134" y="5866867"/>
+                </a:cubicBezTo>
+                <a:cubicBezTo>
+                  <a:pt x="2087178" y="5774877"/>
+                  <a:pt x="1597684" y="5663937"/>
+                  <a:pt x="1112635" y="5534031"/>
+                </a:cubicBezTo>
+                <a:cubicBezTo>
+                  <a:pt x="880453" y="5471934"/>
+                  <a:pt x="649713" y="5405428"/>
+                  <a:pt x="420412" y="5334514"/>
+                </a:cubicBezTo>
+                <a:lnTo>
+                  <a:pt x="0" y="5195539"/>
+                </a:lnTo>
+                <a:lnTo>
+                  <a:pt x="60" y="5105401"/>
+                </a:lnTo>
+                <a:lnTo>
+                  <a:pt x="0" y="5105401"/>
+                </a:lnTo>
+                <a:lnTo>
+                  <a:pt x="0" y="1"/>
+                </a:lnTo>
+                <a:lnTo>
+                  <a:pt x="9834" y="1"/>
+                </a:lnTo>
+                <a:close/>
+              </a:path>
+            </a:pathLst>
+          </a:custGeom>
           <a:solidFill>
-            <a:schemeClr val="bg1"/>
+            <a:schemeClr val="accent2"/>
           </a:solidFill>
           <a:ln>
             <a:noFill/>
@@ -3394,431 +3994,12 @@
           </a:fontRef>
         </p:style>
         <p:txBody>
-          <a:bodyPr rtlCol="0" anchor="ctr"/>
-          <a:lstStyle/>
-          <a:p>
-            <a:pPr algn="ctr"/>
-            <a:endParaRPr lang="en-US" dirty="0"/>
-          </a:p>
-        </p:txBody>
-      </p:sp>
-      <p:sp>
-        <p:nvSpPr>
-          <p:cNvPr id="16" name="Freeform: Shape 10">
-            <a:extLst>
-              <a:ext uri="{FF2B5EF4-FFF2-40B4-BE49-F238E27FC236}">
-                <a16:creationId xmlns:a16="http://schemas.microsoft.com/office/drawing/2014/main" id="{83C98ABE-055B-441F-B07E-44F97F083C39}"/>
-              </a:ext>
-              <a:ext uri="{C183D7F6-B498-43B3-948B-1728B52AA6E4}">
-                <adec:decorative xmlns:adec="http://schemas.microsoft.com/office/drawing/2017/decorative" val="1"/>
-              </a:ext>
-            </a:extLst>
-          </p:cNvPr>
-          <p:cNvSpPr>
-            <a:spLocks noGrp="1" noRot="1" noChangeAspect="1" noMove="1" noResize="1" noEditPoints="1" noAdjustHandles="1" noChangeArrowheads="1" noChangeShapeType="1" noTextEdit="1"/>
-          </p:cNvSpPr>
-          <p:nvPr>
-            <p:extLst>
-              <p:ext uri="{386F3935-93C4-4BCD-93E2-E3B085C9AB24}">
-                <p16:designElem xmlns:p16="http://schemas.microsoft.com/office/powerpoint/2015/main" val="1"/>
-              </p:ext>
-            </p:extLst>
-          </p:nvPr>
-        </p:nvSpPr>
-        <p:spPr>
-          <a:xfrm rot="18900000" flipH="1">
-            <a:off x="-376156" y="-253670"/>
-            <a:ext cx="1827638" cy="1376989"/>
-          </a:xfrm>
-          <a:custGeom>
-            <a:avLst/>
-            <a:gdLst>
-              <a:gd name="connsiteX0" fmla="*/ 0 w 1827638"/>
-              <a:gd name="connsiteY0" fmla="*/ 987379 h 1376989"/>
-              <a:gd name="connsiteX1" fmla="*/ 987379 w 1827638"/>
-              <a:gd name="connsiteY1" fmla="*/ 0 h 1376989"/>
-              <a:gd name="connsiteX2" fmla="*/ 1827638 w 1827638"/>
-              <a:gd name="connsiteY2" fmla="*/ 840260 h 1376989"/>
-              <a:gd name="connsiteX3" fmla="*/ 1827638 w 1827638"/>
-              <a:gd name="connsiteY3" fmla="*/ 1376989 h 1376989"/>
-              <a:gd name="connsiteX4" fmla="*/ 0 w 1827638"/>
-              <a:gd name="connsiteY4" fmla="*/ 1376989 h 1376989"/>
-            </a:gdLst>
-            <a:ahLst/>
-            <a:cxnLst>
-              <a:cxn ang="0">
-                <a:pos x="connsiteX0" y="connsiteY0"/>
-              </a:cxn>
-              <a:cxn ang="0">
-                <a:pos x="connsiteX1" y="connsiteY1"/>
-              </a:cxn>
-              <a:cxn ang="0">
-                <a:pos x="connsiteX2" y="connsiteY2"/>
-              </a:cxn>
-              <a:cxn ang="0">
-                <a:pos x="connsiteX3" y="connsiteY3"/>
-              </a:cxn>
-              <a:cxn ang="0">
-                <a:pos x="connsiteX4" y="connsiteY4"/>
-              </a:cxn>
-            </a:cxnLst>
-            <a:rect l="l" t="t" r="r" b="b"/>
-            <a:pathLst>
-              <a:path w="1827638" h="1376989">
-                <a:moveTo>
-                  <a:pt x="0" y="987379"/>
-                </a:moveTo>
-                <a:lnTo>
-                  <a:pt x="987379" y="0"/>
-                </a:lnTo>
-                <a:lnTo>
-                  <a:pt x="1827638" y="840260"/>
-                </a:lnTo>
-                <a:lnTo>
-                  <a:pt x="1827638" y="1376989"/>
-                </a:lnTo>
-                <a:lnTo>
-                  <a:pt x="0" y="1376989"/>
-                </a:lnTo>
-                <a:close/>
-              </a:path>
-            </a:pathLst>
-          </a:custGeom>
-          <a:solidFill>
-            <a:schemeClr val="accent1">
-              <a:alpha val="30000"/>
-            </a:schemeClr>
-          </a:solidFill>
-          <a:ln>
-            <a:noFill/>
-          </a:ln>
-        </p:spPr>
-        <p:style>
-          <a:lnRef idx="2">
-            <a:schemeClr val="accent1">
-              <a:shade val="50000"/>
-            </a:schemeClr>
-          </a:lnRef>
-          <a:fillRef idx="1">
-            <a:schemeClr val="accent1"/>
-          </a:fillRef>
-          <a:effectRef idx="0">
-            <a:schemeClr val="accent1"/>
-          </a:effectRef>
-          <a:fontRef idx="minor">
-            <a:schemeClr val="lt1"/>
-          </a:fontRef>
-        </p:style>
-        <p:txBody>
-          <a:bodyPr rtlCol="0" anchor="ctr"/>
-          <a:lstStyle/>
-          <a:p>
-            <a:pPr algn="ctr"/>
-            <a:endParaRPr lang="en-US" dirty="0"/>
-          </a:p>
-        </p:txBody>
-      </p:sp>
-      <p:sp>
-        <p:nvSpPr>
-          <p:cNvPr id="13" name="Rectangle 12">
-            <a:extLst>
-              <a:ext uri="{FF2B5EF4-FFF2-40B4-BE49-F238E27FC236}">
-                <a16:creationId xmlns:a16="http://schemas.microsoft.com/office/drawing/2014/main" id="{29FDB030-9B49-4CED-8CCD-4D99382388AC}"/>
-              </a:ext>
-              <a:ext uri="{C183D7F6-B498-43B3-948B-1728B52AA6E4}">
-                <adec:decorative xmlns:adec="http://schemas.microsoft.com/office/drawing/2017/decorative" val="1"/>
-              </a:ext>
-            </a:extLst>
-          </p:cNvPr>
-          <p:cNvSpPr>
-            <a:spLocks noGrp="1" noRot="1" noChangeAspect="1" noMove="1" noResize="1" noEditPoints="1" noAdjustHandles="1" noChangeArrowheads="1" noChangeShapeType="1" noTextEdit="1"/>
-          </p:cNvSpPr>
-          <p:nvPr>
-            <p:extLst>
-              <p:ext uri="{386F3935-93C4-4BCD-93E2-E3B085C9AB24}">
-                <p16:designElem xmlns:p16="http://schemas.microsoft.com/office/powerpoint/2015/main" val="1"/>
-              </p:ext>
-            </p:extLst>
-          </p:nvPr>
-        </p:nvSpPr>
-        <p:spPr>
-          <a:xfrm rot="18900000" flipH="1">
-            <a:off x="891641" y="422146"/>
-            <a:ext cx="645368" cy="645368"/>
-          </a:xfrm>
-          <a:prstGeom prst="rect">
-            <a:avLst/>
-          </a:prstGeom>
-          <a:solidFill>
-            <a:schemeClr val="accent1">
-              <a:alpha val="30000"/>
-            </a:schemeClr>
-          </a:solidFill>
-          <a:ln>
-            <a:noFill/>
-          </a:ln>
-        </p:spPr>
-        <p:style>
-          <a:lnRef idx="2">
-            <a:schemeClr val="accent1">
-              <a:shade val="50000"/>
-            </a:schemeClr>
-          </a:lnRef>
-          <a:fillRef idx="1">
-            <a:schemeClr val="accent1"/>
-          </a:fillRef>
-          <a:effectRef idx="0">
-            <a:schemeClr val="accent1"/>
-          </a:effectRef>
-          <a:fontRef idx="minor">
-            <a:schemeClr val="lt1"/>
-          </a:fontRef>
-        </p:style>
-        <p:txBody>
-          <a:bodyPr rtlCol="0" anchor="ctr"/>
-          <a:lstStyle/>
-          <a:p>
-            <a:pPr algn="ctr"/>
-            <a:endParaRPr lang="en-US"/>
-          </a:p>
-        </p:txBody>
-      </p:sp>
-      <p:sp>
-        <p:nvSpPr>
-          <p:cNvPr id="15" name="Rectangle 14">
-            <a:extLst>
-              <a:ext uri="{FF2B5EF4-FFF2-40B4-BE49-F238E27FC236}">
-                <a16:creationId xmlns:a16="http://schemas.microsoft.com/office/drawing/2014/main" id="{3783CA14-24A1-485C-8B30-D6A5D87987AD}"/>
-              </a:ext>
-              <a:ext uri="{C183D7F6-B498-43B3-948B-1728B52AA6E4}">
-                <adec:decorative xmlns:adec="http://schemas.microsoft.com/office/drawing/2017/decorative" val="1"/>
-              </a:ext>
-            </a:extLst>
-          </p:cNvPr>
-          <p:cNvSpPr>
-            <a:spLocks noGrp="1" noRot="1" noChangeAspect="1" noMove="1" noResize="1" noEditPoints="1" noAdjustHandles="1" noChangeArrowheads="1" noChangeShapeType="1" noTextEdit="1"/>
-          </p:cNvSpPr>
-          <p:nvPr>
-            <p:extLst>
-              <p:ext uri="{386F3935-93C4-4BCD-93E2-E3B085C9AB24}">
-                <p16:designElem xmlns:p16="http://schemas.microsoft.com/office/powerpoint/2015/main" val="1"/>
-              </p:ext>
-            </p:extLst>
-          </p:nvPr>
-        </p:nvSpPr>
-        <p:spPr>
-          <a:xfrm rot="18900000" flipH="1">
-            <a:off x="10043482" y="655140"/>
-            <a:ext cx="687472" cy="687472"/>
-          </a:xfrm>
-          <a:prstGeom prst="rect">
-            <a:avLst/>
-          </a:prstGeom>
-          <a:solidFill>
-            <a:schemeClr val="accent4">
-              <a:alpha val="30000"/>
-            </a:schemeClr>
-          </a:solidFill>
-          <a:ln>
-            <a:noFill/>
-          </a:ln>
-        </p:spPr>
-        <p:style>
-          <a:lnRef idx="2">
-            <a:schemeClr val="accent1">
-              <a:shade val="50000"/>
-            </a:schemeClr>
-          </a:lnRef>
-          <a:fillRef idx="1">
-            <a:schemeClr val="accent1"/>
-          </a:fillRef>
-          <a:effectRef idx="0">
-            <a:schemeClr val="accent1"/>
-          </a:effectRef>
-          <a:fontRef idx="minor">
-            <a:schemeClr val="lt1"/>
-          </a:fontRef>
-        </p:style>
-        <p:txBody>
-          <a:bodyPr rtlCol="0" anchor="ctr"/>
-          <a:lstStyle/>
-          <a:p>
-            <a:pPr algn="ctr"/>
-            <a:endParaRPr lang="en-US"/>
-          </a:p>
-        </p:txBody>
-      </p:sp>
-      <p:sp>
-        <p:nvSpPr>
-          <p:cNvPr id="17" name="Freeform: Shape 16">
-            <a:extLst>
-              <a:ext uri="{FF2B5EF4-FFF2-40B4-BE49-F238E27FC236}">
-                <a16:creationId xmlns:a16="http://schemas.microsoft.com/office/drawing/2014/main" id="{9A97C86A-04D6-40F7-AE84-31AB43E6A846}"/>
-              </a:ext>
-              <a:ext uri="{C183D7F6-B498-43B3-948B-1728B52AA6E4}">
-                <adec:decorative xmlns:adec="http://schemas.microsoft.com/office/drawing/2017/decorative" val="1"/>
-              </a:ext>
-            </a:extLst>
-          </p:cNvPr>
-          <p:cNvSpPr>
-            <a:spLocks noGrp="1" noRot="1" noChangeAspect="1" noMove="1" noResize="1" noEditPoints="1" noAdjustHandles="1" noChangeArrowheads="1" noChangeShapeType="1" noTextEdit="1"/>
-          </p:cNvSpPr>
-          <p:nvPr>
-            <p:extLst>
-              <p:ext uri="{386F3935-93C4-4BCD-93E2-E3B085C9AB24}">
-                <p16:designElem xmlns:p16="http://schemas.microsoft.com/office/powerpoint/2015/main" val="1"/>
-              </p:ext>
-            </p:extLst>
-          </p:nvPr>
-        </p:nvSpPr>
-        <p:spPr>
-          <a:xfrm rot="10800000" flipH="1">
-            <a:off x="9356643" y="0"/>
-            <a:ext cx="2835357" cy="1480837"/>
-          </a:xfrm>
-          <a:custGeom>
-            <a:avLst/>
-            <a:gdLst>
-              <a:gd name="connsiteX0" fmla="*/ 2835357 w 2835357"/>
-              <a:gd name="connsiteY0" fmla="*/ 1480837 h 1480837"/>
-              <a:gd name="connsiteX1" fmla="*/ 0 w 2835357"/>
-              <a:gd name="connsiteY1" fmla="*/ 1480837 h 1480837"/>
-              <a:gd name="connsiteX2" fmla="*/ 1552727 w 2835357"/>
-              <a:gd name="connsiteY2" fmla="*/ 0 h 1480837"/>
-              <a:gd name="connsiteX3" fmla="*/ 2835357 w 2835357"/>
-              <a:gd name="connsiteY3" fmla="*/ 1223245 h 1480837"/>
-            </a:gdLst>
-            <a:ahLst/>
-            <a:cxnLst>
-              <a:cxn ang="0">
-                <a:pos x="connsiteX0" y="connsiteY0"/>
-              </a:cxn>
-              <a:cxn ang="0">
-                <a:pos x="connsiteX1" y="connsiteY1"/>
-              </a:cxn>
-              <a:cxn ang="0">
-                <a:pos x="connsiteX2" y="connsiteY2"/>
-              </a:cxn>
-              <a:cxn ang="0">
-                <a:pos x="connsiteX3" y="connsiteY3"/>
-              </a:cxn>
-            </a:cxnLst>
-            <a:rect l="l" t="t" r="r" b="b"/>
-            <a:pathLst>
-              <a:path w="2835357" h="1480837">
-                <a:moveTo>
-                  <a:pt x="2835357" y="1480837"/>
-                </a:moveTo>
-                <a:lnTo>
-                  <a:pt x="0" y="1480837"/>
-                </a:lnTo>
-                <a:lnTo>
-                  <a:pt x="1552727" y="0"/>
-                </a:lnTo>
-                <a:lnTo>
-                  <a:pt x="2835357" y="1223245"/>
-                </a:lnTo>
-                <a:close/>
-              </a:path>
-            </a:pathLst>
-          </a:custGeom>
-          <a:solidFill>
-            <a:schemeClr val="accent4">
-              <a:alpha val="30000"/>
-            </a:schemeClr>
-          </a:solidFill>
-          <a:ln>
-            <a:noFill/>
-          </a:ln>
-        </p:spPr>
-        <p:style>
-          <a:lnRef idx="2">
-            <a:schemeClr val="accent1">
-              <a:shade val="50000"/>
-            </a:schemeClr>
-          </a:lnRef>
-          <a:fillRef idx="1">
-            <a:schemeClr val="accent1"/>
-          </a:fillRef>
-          <a:effectRef idx="0">
-            <a:schemeClr val="accent1"/>
-          </a:effectRef>
-          <a:fontRef idx="minor">
-            <a:schemeClr val="lt1"/>
-          </a:fontRef>
-        </p:style>
-        <p:txBody>
           <a:bodyPr wrap="square" rtlCol="0" anchor="ctr">
             <a:noAutofit/>
           </a:bodyPr>
           <a:lstStyle/>
           <a:p>
             <a:pPr algn="ctr"/>
-            <a:endParaRPr lang="en-US" dirty="0"/>
-          </a:p>
-        </p:txBody>
-      </p:sp>
-      <p:sp>
-        <p:nvSpPr>
-          <p:cNvPr id="19" name="Isosceles Triangle 18">
-            <a:extLst>
-              <a:ext uri="{FF2B5EF4-FFF2-40B4-BE49-F238E27FC236}">
-                <a16:creationId xmlns:a16="http://schemas.microsoft.com/office/drawing/2014/main" id="{FF9F2414-84E8-453E-B1F3-389FDE8192D9}"/>
-              </a:ext>
-              <a:ext uri="{C183D7F6-B498-43B3-948B-1728B52AA6E4}">
-                <adec:decorative xmlns:adec="http://schemas.microsoft.com/office/drawing/2017/decorative" val="1"/>
-              </a:ext>
-            </a:extLst>
-          </p:cNvPr>
-          <p:cNvSpPr>
-            <a:spLocks noGrp="1" noRot="1" noChangeAspect="1" noMove="1" noResize="1" noEditPoints="1" noAdjustHandles="1" noChangeArrowheads="1" noChangeShapeType="1" noTextEdit="1"/>
-          </p:cNvSpPr>
-          <p:nvPr>
-            <p:extLst>
-              <p:ext uri="{386F3935-93C4-4BCD-93E2-E3B085C9AB24}">
-                <p16:designElem xmlns:p16="http://schemas.microsoft.com/office/powerpoint/2015/main" val="1"/>
-              </p:ext>
-            </p:extLst>
-          </p:nvPr>
-        </p:nvSpPr>
-        <p:spPr>
-          <a:xfrm flipH="1">
-            <a:off x="7976344" y="6115501"/>
-            <a:ext cx="1494513" cy="742499"/>
-          </a:xfrm>
-          <a:prstGeom prst="triangle">
-            <a:avLst/>
-          </a:prstGeom>
-          <a:solidFill>
-            <a:schemeClr val="accent1">
-              <a:alpha val="30000"/>
-            </a:schemeClr>
-          </a:solidFill>
-          <a:ln>
-            <a:noFill/>
-          </a:ln>
-        </p:spPr>
-        <p:style>
-          <a:lnRef idx="2">
-            <a:schemeClr val="accent1">
-              <a:shade val="50000"/>
-            </a:schemeClr>
-          </a:lnRef>
-          <a:fillRef idx="1">
-            <a:schemeClr val="accent1"/>
-          </a:fillRef>
-          <a:effectRef idx="0">
-            <a:schemeClr val="accent1"/>
-          </a:effectRef>
-          <a:fontRef idx="minor">
-            <a:schemeClr val="lt1"/>
-          </a:fontRef>
-        </p:style>
-        <p:txBody>
-          <a:bodyPr rtlCol="0" anchor="ctr"/>
-          <a:lstStyle/>
-          <a:p>
-            <a:pPr algn="ctr"/>
             <a:endParaRPr lang="en-US"/>
           </a:p>
         </p:txBody>
@@ -3828,7 +4009,7 @@
           <p:cNvPr id="4" name="Picture 3" descr="Text&#10;&#10;Description automatically generated">
             <a:extLst>
               <a:ext uri="{FF2B5EF4-FFF2-40B4-BE49-F238E27FC236}">
-                <a16:creationId xmlns:a16="http://schemas.microsoft.com/office/drawing/2014/main" id="{0531C8B1-2190-7771-0EB7-F367DB02AA67}"/>
+                <a16:creationId xmlns:a16="http://schemas.microsoft.com/office/drawing/2014/main" id="{29DB7CC5-9519-FCF2-71E1-CC54AF86E71A}"/>
               </a:ext>
             </a:extLst>
           </p:cNvPr>
@@ -3851,82 +4032,14 @@
         </p:blipFill>
         <p:spPr>
           <a:xfrm>
-            <a:off x="147368" y="720540"/>
-            <a:ext cx="11897263" cy="5383512"/>
+            <a:off x="228600" y="708565"/>
+            <a:ext cx="11658600" cy="3993069"/>
           </a:xfrm>
           <a:prstGeom prst="rect">
             <a:avLst/>
           </a:prstGeom>
-          <a:ln>
-            <a:noFill/>
-          </a:ln>
         </p:spPr>
       </p:pic>
-      <p:sp>
-        <p:nvSpPr>
-          <p:cNvPr id="21" name="Isosceles Triangle 20">
-            <a:extLst>
-              <a:ext uri="{FF2B5EF4-FFF2-40B4-BE49-F238E27FC236}">
-                <a16:creationId xmlns:a16="http://schemas.microsoft.com/office/drawing/2014/main" id="{3ECA69A1-7536-43AC-85EF-C7106179F5ED}"/>
-              </a:ext>
-              <a:ext uri="{C183D7F6-B498-43B3-948B-1728B52AA6E4}">
-                <adec:decorative xmlns:adec="http://schemas.microsoft.com/office/drawing/2017/decorative" val="1"/>
-              </a:ext>
-            </a:extLst>
-          </p:cNvPr>
-          <p:cNvSpPr>
-            <a:spLocks noGrp="1" noRot="1" noChangeAspect="1" noMove="1" noResize="1" noEditPoints="1" noAdjustHandles="1" noChangeArrowheads="1" noChangeShapeType="1" noTextEdit="1"/>
-          </p:cNvSpPr>
-          <p:nvPr>
-            <p:extLst>
-              <p:ext uri="{386F3935-93C4-4BCD-93E2-E3B085C9AB24}">
-                <p16:designElem xmlns:p16="http://schemas.microsoft.com/office/powerpoint/2015/main" val="1"/>
-              </p:ext>
-            </p:extLst>
-          </p:nvPr>
-        </p:nvSpPr>
-        <p:spPr>
-          <a:xfrm flipH="1">
-            <a:off x="7604080" y="6453143"/>
-            <a:ext cx="814903" cy="404857"/>
-          </a:xfrm>
-          <a:prstGeom prst="triangle">
-            <a:avLst/>
-          </a:prstGeom>
-          <a:solidFill>
-            <a:schemeClr val="accent1">
-              <a:alpha val="30000"/>
-            </a:schemeClr>
-          </a:solidFill>
-          <a:ln>
-            <a:noFill/>
-          </a:ln>
-        </p:spPr>
-        <p:style>
-          <a:lnRef idx="2">
-            <a:schemeClr val="accent1">
-              <a:shade val="50000"/>
-            </a:schemeClr>
-          </a:lnRef>
-          <a:fillRef idx="1">
-            <a:schemeClr val="accent1"/>
-          </a:fillRef>
-          <a:effectRef idx="0">
-            <a:schemeClr val="accent1"/>
-          </a:effectRef>
-          <a:fontRef idx="minor">
-            <a:schemeClr val="lt1"/>
-          </a:fontRef>
-        </p:style>
-        <p:txBody>
-          <a:bodyPr rtlCol="0" anchor="ctr"/>
-          <a:lstStyle/>
-          <a:p>
-            <a:pPr algn="ctr"/>
-            <a:endParaRPr lang="en-US"/>
-          </a:p>
-        </p:txBody>
-      </p:sp>
     </p:spTree>
     <p:extLst>
       <p:ext uri="{BB962C8B-B14F-4D97-AF65-F5344CB8AC3E}">
@@ -3965,12 +4078,12 @@
           <a:chExt cx="0" cy="0"/>
         </a:xfrm>
       </p:grpSpPr>
-      <p:sp>
-        <p:nvSpPr>
-          <p:cNvPr id="68" name="Rectangle 67">
-            <a:extLst>
-              <a:ext uri="{FF2B5EF4-FFF2-40B4-BE49-F238E27FC236}">
-                <a16:creationId xmlns:a16="http://schemas.microsoft.com/office/drawing/2014/main" id="{F3060C83-F051-4F0E-ABAD-AA0DFC48B218}"/>
+      <p:sp useBgFill="1">
+        <p:nvSpPr>
+          <p:cNvPr id="96" name="Rectangle 95">
+            <a:extLst>
+              <a:ext uri="{FF2B5EF4-FFF2-40B4-BE49-F238E27FC236}">
+                <a16:creationId xmlns:a16="http://schemas.microsoft.com/office/drawing/2014/main" id="{DA2E7C1E-2B5A-4BBA-AE51-1CD8C19309D7}"/>
               </a:ext>
               <a:ext uri="{C183D7F6-B498-43B3-948B-1728B52AA6E4}">
                 <adec:decorative xmlns:adec="http://schemas.microsoft.com/office/drawing/2017/decorative" val="1"/>
@@ -3991,14 +4104,11 @@
         <p:spPr>
           <a:xfrm>
             <a:off x="0" y="0"/>
-            <a:ext cx="12192000" cy="6858000"/>
+            <a:ext cx="12188952" cy="6858000"/>
           </a:xfrm>
           <a:prstGeom prst="rect">
             <a:avLst/>
           </a:prstGeom>
-          <a:solidFill>
-            <a:schemeClr val="bg1"/>
-          </a:solidFill>
           <a:ln>
             <a:noFill/>
           </a:ln>
@@ -4024,16 +4134,16 @@
           <a:lstStyle/>
           <a:p>
             <a:pPr algn="ctr"/>
-            <a:endParaRPr lang="en-US" dirty="0"/>
-          </a:p>
-        </p:txBody>
-      </p:sp>
-      <p:sp>
-        <p:nvSpPr>
-          <p:cNvPr id="70" name="Freeform: Shape 69">
-            <a:extLst>
-              <a:ext uri="{FF2B5EF4-FFF2-40B4-BE49-F238E27FC236}">
-                <a16:creationId xmlns:a16="http://schemas.microsoft.com/office/drawing/2014/main" id="{83C98ABE-055B-441F-B07E-44F97F083C39}"/>
+            <a:endParaRPr lang="en-US"/>
+          </a:p>
+        </p:txBody>
+      </p:sp>
+      <p:sp>
+        <p:nvSpPr>
+          <p:cNvPr id="98" name="Rectangle 6">
+            <a:extLst>
+              <a:ext uri="{FF2B5EF4-FFF2-40B4-BE49-F238E27FC236}">
+                <a16:creationId xmlns:a16="http://schemas.microsoft.com/office/drawing/2014/main" id="{43DF76B1-5174-4FAF-9D19-FFEE98426836}"/>
               </a:ext>
               <a:ext uri="{C183D7F6-B498-43B3-948B-1728B52AA6E4}">
                 <adec:decorative xmlns:adec="http://schemas.microsoft.com/office/drawing/2017/decorative" val="1"/>
@@ -4052,23 +4162,115 @@
           </p:nvPr>
         </p:nvSpPr>
         <p:spPr>
-          <a:xfrm rot="18900000" flipH="1">
-            <a:off x="-376156" y="-253670"/>
-            <a:ext cx="1827638" cy="1376989"/>
+          <a:xfrm flipV="1">
+            <a:off x="838200" y="720953"/>
+            <a:ext cx="10515600" cy="5416094"/>
           </a:xfrm>
           <a:custGeom>
             <a:avLst/>
             <a:gdLst>
-              <a:gd name="connsiteX0" fmla="*/ 0 w 1827638"/>
-              <a:gd name="connsiteY0" fmla="*/ 987379 h 1376989"/>
-              <a:gd name="connsiteX1" fmla="*/ 987379 w 1827638"/>
-              <a:gd name="connsiteY1" fmla="*/ 0 h 1376989"/>
-              <a:gd name="connsiteX2" fmla="*/ 1827638 w 1827638"/>
-              <a:gd name="connsiteY2" fmla="*/ 840260 h 1376989"/>
-              <a:gd name="connsiteX3" fmla="*/ 1827638 w 1827638"/>
-              <a:gd name="connsiteY3" fmla="*/ 1376989 h 1376989"/>
-              <a:gd name="connsiteX4" fmla="*/ 0 w 1827638"/>
-              <a:gd name="connsiteY4" fmla="*/ 1376989 h 1376989"/>
+              <a:gd name="connsiteX0" fmla="*/ 0 w 10515600"/>
+              <a:gd name="connsiteY0" fmla="*/ 0 h 5416094"/>
+              <a:gd name="connsiteX1" fmla="*/ 552069 w 10515600"/>
+              <a:gd name="connsiteY1" fmla="*/ 0 h 5416094"/>
+              <a:gd name="connsiteX2" fmla="*/ 893826 w 10515600"/>
+              <a:gd name="connsiteY2" fmla="*/ 0 h 5416094"/>
+              <a:gd name="connsiteX3" fmla="*/ 1761363 w 10515600"/>
+              <a:gd name="connsiteY3" fmla="*/ 0 h 5416094"/>
+              <a:gd name="connsiteX4" fmla="*/ 2313432 w 10515600"/>
+              <a:gd name="connsiteY4" fmla="*/ 0 h 5416094"/>
+              <a:gd name="connsiteX5" fmla="*/ 2865501 w 10515600"/>
+              <a:gd name="connsiteY5" fmla="*/ 0 h 5416094"/>
+              <a:gd name="connsiteX6" fmla="*/ 3733038 w 10515600"/>
+              <a:gd name="connsiteY6" fmla="*/ 0 h 5416094"/>
+              <a:gd name="connsiteX7" fmla="*/ 4179951 w 10515600"/>
+              <a:gd name="connsiteY7" fmla="*/ 0 h 5416094"/>
+              <a:gd name="connsiteX8" fmla="*/ 5047488 w 10515600"/>
+              <a:gd name="connsiteY8" fmla="*/ 0 h 5416094"/>
+              <a:gd name="connsiteX9" fmla="*/ 5915025 w 10515600"/>
+              <a:gd name="connsiteY9" fmla="*/ 0 h 5416094"/>
+              <a:gd name="connsiteX10" fmla="*/ 6572250 w 10515600"/>
+              <a:gd name="connsiteY10" fmla="*/ 0 h 5416094"/>
+              <a:gd name="connsiteX11" fmla="*/ 7439787 w 10515600"/>
+              <a:gd name="connsiteY11" fmla="*/ 0 h 5416094"/>
+              <a:gd name="connsiteX12" fmla="*/ 7991856 w 10515600"/>
+              <a:gd name="connsiteY12" fmla="*/ 0 h 5416094"/>
+              <a:gd name="connsiteX13" fmla="*/ 8543925 w 10515600"/>
+              <a:gd name="connsiteY13" fmla="*/ 0 h 5416094"/>
+              <a:gd name="connsiteX14" fmla="*/ 9306306 w 10515600"/>
+              <a:gd name="connsiteY14" fmla="*/ 0 h 5416094"/>
+              <a:gd name="connsiteX15" fmla="*/ 9858375 w 10515600"/>
+              <a:gd name="connsiteY15" fmla="*/ 0 h 5416094"/>
+              <a:gd name="connsiteX16" fmla="*/ 10515600 w 10515600"/>
+              <a:gd name="connsiteY16" fmla="*/ 0 h 5416094"/>
+              <a:gd name="connsiteX17" fmla="*/ 10515600 w 10515600"/>
+              <a:gd name="connsiteY17" fmla="*/ 785334 h 5416094"/>
+              <a:gd name="connsiteX18" fmla="*/ 10515600 w 10515600"/>
+              <a:gd name="connsiteY18" fmla="*/ 1516506 h 5416094"/>
+              <a:gd name="connsiteX19" fmla="*/ 10515600 w 10515600"/>
+              <a:gd name="connsiteY19" fmla="*/ 2247679 h 5416094"/>
+              <a:gd name="connsiteX20" fmla="*/ 10515600 w 10515600"/>
+              <a:gd name="connsiteY20" fmla="*/ 2762208 h 5416094"/>
+              <a:gd name="connsiteX21" fmla="*/ 10515600 w 10515600"/>
+              <a:gd name="connsiteY21" fmla="*/ 3330898 h 5416094"/>
+              <a:gd name="connsiteX22" fmla="*/ 10515600 w 10515600"/>
+              <a:gd name="connsiteY22" fmla="*/ 4062071 h 5416094"/>
+              <a:gd name="connsiteX23" fmla="*/ 10515600 w 10515600"/>
+              <a:gd name="connsiteY23" fmla="*/ 4684921 h 5416094"/>
+              <a:gd name="connsiteX24" fmla="*/ 10515600 w 10515600"/>
+              <a:gd name="connsiteY24" fmla="*/ 5416094 h 5416094"/>
+              <a:gd name="connsiteX25" fmla="*/ 9753219 w 10515600"/>
+              <a:gd name="connsiteY25" fmla="*/ 5416094 h 5416094"/>
+              <a:gd name="connsiteX26" fmla="*/ 9411462 w 10515600"/>
+              <a:gd name="connsiteY26" fmla="*/ 5416094 h 5416094"/>
+              <a:gd name="connsiteX27" fmla="*/ 8754237 w 10515600"/>
+              <a:gd name="connsiteY27" fmla="*/ 5416094 h 5416094"/>
+              <a:gd name="connsiteX28" fmla="*/ 8307324 w 10515600"/>
+              <a:gd name="connsiteY28" fmla="*/ 5416094 h 5416094"/>
+              <a:gd name="connsiteX29" fmla="*/ 7544943 w 10515600"/>
+              <a:gd name="connsiteY29" fmla="*/ 5416094 h 5416094"/>
+              <a:gd name="connsiteX30" fmla="*/ 7098030 w 10515600"/>
+              <a:gd name="connsiteY30" fmla="*/ 5416094 h 5416094"/>
+              <a:gd name="connsiteX31" fmla="*/ 6335649 w 10515600"/>
+              <a:gd name="connsiteY31" fmla="*/ 5416094 h 5416094"/>
+              <a:gd name="connsiteX32" fmla="*/ 5993892 w 10515600"/>
+              <a:gd name="connsiteY32" fmla="*/ 5416094 h 5416094"/>
+              <a:gd name="connsiteX33" fmla="*/ 5231511 w 10515600"/>
+              <a:gd name="connsiteY33" fmla="*/ 5416094 h 5416094"/>
+              <a:gd name="connsiteX34" fmla="*/ 4784598 w 10515600"/>
+              <a:gd name="connsiteY34" fmla="*/ 5416094 h 5416094"/>
+              <a:gd name="connsiteX35" fmla="*/ 4442841 w 10515600"/>
+              <a:gd name="connsiteY35" fmla="*/ 5416094 h 5416094"/>
+              <a:gd name="connsiteX36" fmla="*/ 3995928 w 10515600"/>
+              <a:gd name="connsiteY36" fmla="*/ 5416094 h 5416094"/>
+              <a:gd name="connsiteX37" fmla="*/ 3233547 w 10515600"/>
+              <a:gd name="connsiteY37" fmla="*/ 5416094 h 5416094"/>
+              <a:gd name="connsiteX38" fmla="*/ 2786634 w 10515600"/>
+              <a:gd name="connsiteY38" fmla="*/ 5416094 h 5416094"/>
+              <a:gd name="connsiteX39" fmla="*/ 2444877 w 10515600"/>
+              <a:gd name="connsiteY39" fmla="*/ 5416094 h 5416094"/>
+              <a:gd name="connsiteX40" fmla="*/ 1997964 w 10515600"/>
+              <a:gd name="connsiteY40" fmla="*/ 5416094 h 5416094"/>
+              <a:gd name="connsiteX41" fmla="*/ 1445895 w 10515600"/>
+              <a:gd name="connsiteY41" fmla="*/ 5416094 h 5416094"/>
+              <a:gd name="connsiteX42" fmla="*/ 788670 w 10515600"/>
+              <a:gd name="connsiteY42" fmla="*/ 5416094 h 5416094"/>
+              <a:gd name="connsiteX43" fmla="*/ 0 w 10515600"/>
+              <a:gd name="connsiteY43" fmla="*/ 5416094 h 5416094"/>
+              <a:gd name="connsiteX44" fmla="*/ 0 w 10515600"/>
+              <a:gd name="connsiteY44" fmla="*/ 4630760 h 5416094"/>
+              <a:gd name="connsiteX45" fmla="*/ 0 w 10515600"/>
+              <a:gd name="connsiteY45" fmla="*/ 3953749 h 5416094"/>
+              <a:gd name="connsiteX46" fmla="*/ 0 w 10515600"/>
+              <a:gd name="connsiteY46" fmla="*/ 3276737 h 5416094"/>
+              <a:gd name="connsiteX47" fmla="*/ 0 w 10515600"/>
+              <a:gd name="connsiteY47" fmla="*/ 2599725 h 5416094"/>
+              <a:gd name="connsiteX48" fmla="*/ 0 w 10515600"/>
+              <a:gd name="connsiteY48" fmla="*/ 1922713 h 5416094"/>
+              <a:gd name="connsiteX49" fmla="*/ 0 w 10515600"/>
+              <a:gd name="connsiteY49" fmla="*/ 1299863 h 5416094"/>
+              <a:gd name="connsiteX50" fmla="*/ 0 w 10515600"/>
+              <a:gd name="connsiteY50" fmla="*/ 0 h 5416094"/>
             </a:gdLst>
             <a:ahLst/>
             <a:cxnLst>
@@ -4087,36 +4289,423 @@
               <a:cxn ang="0">
                 <a:pos x="connsiteX4" y="connsiteY4"/>
               </a:cxn>
+              <a:cxn ang="0">
+                <a:pos x="connsiteX5" y="connsiteY5"/>
+              </a:cxn>
+              <a:cxn ang="0">
+                <a:pos x="connsiteX6" y="connsiteY6"/>
+              </a:cxn>
+              <a:cxn ang="0">
+                <a:pos x="connsiteX7" y="connsiteY7"/>
+              </a:cxn>
+              <a:cxn ang="0">
+                <a:pos x="connsiteX8" y="connsiteY8"/>
+              </a:cxn>
+              <a:cxn ang="0">
+                <a:pos x="connsiteX9" y="connsiteY9"/>
+              </a:cxn>
+              <a:cxn ang="0">
+                <a:pos x="connsiteX10" y="connsiteY10"/>
+              </a:cxn>
+              <a:cxn ang="0">
+                <a:pos x="connsiteX11" y="connsiteY11"/>
+              </a:cxn>
+              <a:cxn ang="0">
+                <a:pos x="connsiteX12" y="connsiteY12"/>
+              </a:cxn>
+              <a:cxn ang="0">
+                <a:pos x="connsiteX13" y="connsiteY13"/>
+              </a:cxn>
+              <a:cxn ang="0">
+                <a:pos x="connsiteX14" y="connsiteY14"/>
+              </a:cxn>
+              <a:cxn ang="0">
+                <a:pos x="connsiteX15" y="connsiteY15"/>
+              </a:cxn>
+              <a:cxn ang="0">
+                <a:pos x="connsiteX16" y="connsiteY16"/>
+              </a:cxn>
+              <a:cxn ang="0">
+                <a:pos x="connsiteX17" y="connsiteY17"/>
+              </a:cxn>
+              <a:cxn ang="0">
+                <a:pos x="connsiteX18" y="connsiteY18"/>
+              </a:cxn>
+              <a:cxn ang="0">
+                <a:pos x="connsiteX19" y="connsiteY19"/>
+              </a:cxn>
+              <a:cxn ang="0">
+                <a:pos x="connsiteX20" y="connsiteY20"/>
+              </a:cxn>
+              <a:cxn ang="0">
+                <a:pos x="connsiteX21" y="connsiteY21"/>
+              </a:cxn>
+              <a:cxn ang="0">
+                <a:pos x="connsiteX22" y="connsiteY22"/>
+              </a:cxn>
+              <a:cxn ang="0">
+                <a:pos x="connsiteX23" y="connsiteY23"/>
+              </a:cxn>
+              <a:cxn ang="0">
+                <a:pos x="connsiteX24" y="connsiteY24"/>
+              </a:cxn>
+              <a:cxn ang="0">
+                <a:pos x="connsiteX25" y="connsiteY25"/>
+              </a:cxn>
+              <a:cxn ang="0">
+                <a:pos x="connsiteX26" y="connsiteY26"/>
+              </a:cxn>
+              <a:cxn ang="0">
+                <a:pos x="connsiteX27" y="connsiteY27"/>
+              </a:cxn>
+              <a:cxn ang="0">
+                <a:pos x="connsiteX28" y="connsiteY28"/>
+              </a:cxn>
+              <a:cxn ang="0">
+                <a:pos x="connsiteX29" y="connsiteY29"/>
+              </a:cxn>
+              <a:cxn ang="0">
+                <a:pos x="connsiteX30" y="connsiteY30"/>
+              </a:cxn>
+              <a:cxn ang="0">
+                <a:pos x="connsiteX31" y="connsiteY31"/>
+              </a:cxn>
+              <a:cxn ang="0">
+                <a:pos x="connsiteX32" y="connsiteY32"/>
+              </a:cxn>
+              <a:cxn ang="0">
+                <a:pos x="connsiteX33" y="connsiteY33"/>
+              </a:cxn>
+              <a:cxn ang="0">
+                <a:pos x="connsiteX34" y="connsiteY34"/>
+              </a:cxn>
+              <a:cxn ang="0">
+                <a:pos x="connsiteX35" y="connsiteY35"/>
+              </a:cxn>
+              <a:cxn ang="0">
+                <a:pos x="connsiteX36" y="connsiteY36"/>
+              </a:cxn>
+              <a:cxn ang="0">
+                <a:pos x="connsiteX37" y="connsiteY37"/>
+              </a:cxn>
+              <a:cxn ang="0">
+                <a:pos x="connsiteX38" y="connsiteY38"/>
+              </a:cxn>
+              <a:cxn ang="0">
+                <a:pos x="connsiteX39" y="connsiteY39"/>
+              </a:cxn>
+              <a:cxn ang="0">
+                <a:pos x="connsiteX40" y="connsiteY40"/>
+              </a:cxn>
+              <a:cxn ang="0">
+                <a:pos x="connsiteX41" y="connsiteY41"/>
+              </a:cxn>
+              <a:cxn ang="0">
+                <a:pos x="connsiteX42" y="connsiteY42"/>
+              </a:cxn>
+              <a:cxn ang="0">
+                <a:pos x="connsiteX43" y="connsiteY43"/>
+              </a:cxn>
+              <a:cxn ang="0">
+                <a:pos x="connsiteX44" y="connsiteY44"/>
+              </a:cxn>
+              <a:cxn ang="0">
+                <a:pos x="connsiteX45" y="connsiteY45"/>
+              </a:cxn>
+              <a:cxn ang="0">
+                <a:pos x="connsiteX46" y="connsiteY46"/>
+              </a:cxn>
+              <a:cxn ang="0">
+                <a:pos x="connsiteX47" y="connsiteY47"/>
+              </a:cxn>
+              <a:cxn ang="0">
+                <a:pos x="connsiteX48" y="connsiteY48"/>
+              </a:cxn>
+              <a:cxn ang="0">
+                <a:pos x="connsiteX49" y="connsiteY49"/>
+              </a:cxn>
+              <a:cxn ang="0">
+                <a:pos x="connsiteX50" y="connsiteY50"/>
+              </a:cxn>
             </a:cxnLst>
             <a:rect l="l" t="t" r="r" b="b"/>
             <a:pathLst>
-              <a:path w="1827638" h="1376989">
+              <a:path w="10515600" h="5416094" extrusionOk="0">
                 <a:moveTo>
-                  <a:pt x="0" y="987379"/>
+                  <a:pt x="0" y="0"/>
                 </a:moveTo>
-                <a:lnTo>
-                  <a:pt x="987379" y="0"/>
-                </a:lnTo>
-                <a:lnTo>
-                  <a:pt x="1827638" y="840260"/>
-                </a:lnTo>
-                <a:lnTo>
-                  <a:pt x="1827638" y="1376989"/>
-                </a:lnTo>
-                <a:lnTo>
-                  <a:pt x="0" y="1376989"/>
-                </a:lnTo>
+                <a:cubicBezTo>
+                  <a:pt x="230793" y="14353"/>
+                  <a:pt x="332416" y="21392"/>
+                  <a:pt x="552069" y="0"/>
+                </a:cubicBezTo>
+                <a:cubicBezTo>
+                  <a:pt x="771722" y="-21392"/>
+                  <a:pt x="761737" y="-14337"/>
+                  <a:pt x="893826" y="0"/>
+                </a:cubicBezTo>
+                <a:cubicBezTo>
+                  <a:pt x="1025915" y="14337"/>
+                  <a:pt x="1441584" y="-15498"/>
+                  <a:pt x="1761363" y="0"/>
+                </a:cubicBezTo>
+                <a:cubicBezTo>
+                  <a:pt x="2081142" y="15498"/>
+                  <a:pt x="2111503" y="7278"/>
+                  <a:pt x="2313432" y="0"/>
+                </a:cubicBezTo>
+                <a:cubicBezTo>
+                  <a:pt x="2515361" y="-7278"/>
+                  <a:pt x="2743584" y="-17845"/>
+                  <a:pt x="2865501" y="0"/>
+                </a:cubicBezTo>
+                <a:cubicBezTo>
+                  <a:pt x="2987418" y="17845"/>
+                  <a:pt x="3345183" y="8208"/>
+                  <a:pt x="3733038" y="0"/>
+                </a:cubicBezTo>
+                <a:cubicBezTo>
+                  <a:pt x="4120893" y="-8208"/>
+                  <a:pt x="4009066" y="-3159"/>
+                  <a:pt x="4179951" y="0"/>
+                </a:cubicBezTo>
+                <a:cubicBezTo>
+                  <a:pt x="4350836" y="3159"/>
+                  <a:pt x="4735020" y="17517"/>
+                  <a:pt x="5047488" y="0"/>
+                </a:cubicBezTo>
+                <a:cubicBezTo>
+                  <a:pt x="5359956" y="-17517"/>
+                  <a:pt x="5662148" y="-17777"/>
+                  <a:pt x="5915025" y="0"/>
+                </a:cubicBezTo>
+                <a:cubicBezTo>
+                  <a:pt x="6167902" y="17777"/>
+                  <a:pt x="6308797" y="30350"/>
+                  <a:pt x="6572250" y="0"/>
+                </a:cubicBezTo>
+                <a:cubicBezTo>
+                  <a:pt x="6835703" y="-30350"/>
+                  <a:pt x="7107419" y="-9627"/>
+                  <a:pt x="7439787" y="0"/>
+                </a:cubicBezTo>
+                <a:cubicBezTo>
+                  <a:pt x="7772155" y="9627"/>
+                  <a:pt x="7844034" y="-9098"/>
+                  <a:pt x="7991856" y="0"/>
+                </a:cubicBezTo>
+                <a:cubicBezTo>
+                  <a:pt x="8139678" y="9098"/>
+                  <a:pt x="8289889" y="-20239"/>
+                  <a:pt x="8543925" y="0"/>
+                </a:cubicBezTo>
+                <a:cubicBezTo>
+                  <a:pt x="8797961" y="20239"/>
+                  <a:pt x="8994198" y="29575"/>
+                  <a:pt x="9306306" y="0"/>
+                </a:cubicBezTo>
+                <a:cubicBezTo>
+                  <a:pt x="9618414" y="-29575"/>
+                  <a:pt x="9739118" y="-23835"/>
+                  <a:pt x="9858375" y="0"/>
+                </a:cubicBezTo>
+                <a:cubicBezTo>
+                  <a:pt x="9977632" y="23835"/>
+                  <a:pt x="10370488" y="-4069"/>
+                  <a:pt x="10515600" y="0"/>
+                </a:cubicBezTo>
+                <a:cubicBezTo>
+                  <a:pt x="10524919" y="196329"/>
+                  <a:pt x="10549062" y="488432"/>
+                  <a:pt x="10515600" y="785334"/>
+                </a:cubicBezTo>
+                <a:cubicBezTo>
+                  <a:pt x="10482138" y="1082236"/>
+                  <a:pt x="10536385" y="1323726"/>
+                  <a:pt x="10515600" y="1516506"/>
+                </a:cubicBezTo>
+                <a:cubicBezTo>
+                  <a:pt x="10494815" y="1709286"/>
+                  <a:pt x="10546328" y="2097632"/>
+                  <a:pt x="10515600" y="2247679"/>
+                </a:cubicBezTo>
+                <a:cubicBezTo>
+                  <a:pt x="10484872" y="2397726"/>
+                  <a:pt x="10491771" y="2577292"/>
+                  <a:pt x="10515600" y="2762208"/>
+                </a:cubicBezTo>
+                <a:cubicBezTo>
+                  <a:pt x="10539429" y="2947124"/>
+                  <a:pt x="10511007" y="3105736"/>
+                  <a:pt x="10515600" y="3330898"/>
+                </a:cubicBezTo>
+                <a:cubicBezTo>
+                  <a:pt x="10520194" y="3556060"/>
+                  <a:pt x="10497393" y="3882611"/>
+                  <a:pt x="10515600" y="4062071"/>
+                </a:cubicBezTo>
+                <a:cubicBezTo>
+                  <a:pt x="10533807" y="4241531"/>
+                  <a:pt x="10544791" y="4505155"/>
+                  <a:pt x="10515600" y="4684921"/>
+                </a:cubicBezTo>
+                <a:cubicBezTo>
+                  <a:pt x="10486410" y="4864687"/>
+                  <a:pt x="10497356" y="5246484"/>
+                  <a:pt x="10515600" y="5416094"/>
+                </a:cubicBezTo>
+                <a:cubicBezTo>
+                  <a:pt x="10245623" y="5445692"/>
+                  <a:pt x="10029676" y="5415505"/>
+                  <a:pt x="9753219" y="5416094"/>
+                </a:cubicBezTo>
+                <a:cubicBezTo>
+                  <a:pt x="9476762" y="5416683"/>
+                  <a:pt x="9553148" y="5422760"/>
+                  <a:pt x="9411462" y="5416094"/>
+                </a:cubicBezTo>
+                <a:cubicBezTo>
+                  <a:pt x="9269776" y="5409428"/>
+                  <a:pt x="8927709" y="5385012"/>
+                  <a:pt x="8754237" y="5416094"/>
+                </a:cubicBezTo>
+                <a:cubicBezTo>
+                  <a:pt x="8580766" y="5447176"/>
+                  <a:pt x="8413264" y="5410024"/>
+                  <a:pt x="8307324" y="5416094"/>
+                </a:cubicBezTo>
+                <a:cubicBezTo>
+                  <a:pt x="8201384" y="5422164"/>
+                  <a:pt x="7912690" y="5421686"/>
+                  <a:pt x="7544943" y="5416094"/>
+                </a:cubicBezTo>
+                <a:cubicBezTo>
+                  <a:pt x="7177196" y="5410502"/>
+                  <a:pt x="7304235" y="5418502"/>
+                  <a:pt x="7098030" y="5416094"/>
+                </a:cubicBezTo>
+                <a:cubicBezTo>
+                  <a:pt x="6891825" y="5413686"/>
+                  <a:pt x="6541479" y="5434609"/>
+                  <a:pt x="6335649" y="5416094"/>
+                </a:cubicBezTo>
+                <a:cubicBezTo>
+                  <a:pt x="6129819" y="5397579"/>
+                  <a:pt x="6106541" y="5402791"/>
+                  <a:pt x="5993892" y="5416094"/>
+                </a:cubicBezTo>
+                <a:cubicBezTo>
+                  <a:pt x="5881243" y="5429397"/>
+                  <a:pt x="5545248" y="5437743"/>
+                  <a:pt x="5231511" y="5416094"/>
+                </a:cubicBezTo>
+                <a:cubicBezTo>
+                  <a:pt x="4917774" y="5394445"/>
+                  <a:pt x="4963237" y="5426599"/>
+                  <a:pt x="4784598" y="5416094"/>
+                </a:cubicBezTo>
+                <a:cubicBezTo>
+                  <a:pt x="4605959" y="5405589"/>
+                  <a:pt x="4605904" y="5406658"/>
+                  <a:pt x="4442841" y="5416094"/>
+                </a:cubicBezTo>
+                <a:cubicBezTo>
+                  <a:pt x="4279778" y="5425530"/>
+                  <a:pt x="4177180" y="5426138"/>
+                  <a:pt x="3995928" y="5416094"/>
+                </a:cubicBezTo>
+                <a:cubicBezTo>
+                  <a:pt x="3814676" y="5406050"/>
+                  <a:pt x="3516440" y="5429234"/>
+                  <a:pt x="3233547" y="5416094"/>
+                </a:cubicBezTo>
+                <a:cubicBezTo>
+                  <a:pt x="2950654" y="5402954"/>
+                  <a:pt x="2884354" y="5436103"/>
+                  <a:pt x="2786634" y="5416094"/>
+                </a:cubicBezTo>
+                <a:cubicBezTo>
+                  <a:pt x="2688914" y="5396085"/>
+                  <a:pt x="2522958" y="5423232"/>
+                  <a:pt x="2444877" y="5416094"/>
+                </a:cubicBezTo>
+                <a:cubicBezTo>
+                  <a:pt x="2366796" y="5408956"/>
+                  <a:pt x="2104768" y="5395479"/>
+                  <a:pt x="1997964" y="5416094"/>
+                </a:cubicBezTo>
+                <a:cubicBezTo>
+                  <a:pt x="1891160" y="5436709"/>
+                  <a:pt x="1573016" y="5412376"/>
+                  <a:pt x="1445895" y="5416094"/>
+                </a:cubicBezTo>
+                <a:cubicBezTo>
+                  <a:pt x="1318774" y="5419812"/>
+                  <a:pt x="986443" y="5400529"/>
+                  <a:pt x="788670" y="5416094"/>
+                </a:cubicBezTo>
+                <a:cubicBezTo>
+                  <a:pt x="590897" y="5431659"/>
+                  <a:pt x="363709" y="5381266"/>
+                  <a:pt x="0" y="5416094"/>
+                </a:cubicBezTo>
+                <a:cubicBezTo>
+                  <a:pt x="-22973" y="5218643"/>
+                  <a:pt x="-26699" y="5010779"/>
+                  <a:pt x="0" y="4630760"/>
+                </a:cubicBezTo>
+                <a:cubicBezTo>
+                  <a:pt x="26699" y="4250741"/>
+                  <a:pt x="-15389" y="4196664"/>
+                  <a:pt x="0" y="3953749"/>
+                </a:cubicBezTo>
+                <a:cubicBezTo>
+                  <a:pt x="15389" y="3710834"/>
+                  <a:pt x="468" y="3611311"/>
+                  <a:pt x="0" y="3276737"/>
+                </a:cubicBezTo>
+                <a:cubicBezTo>
+                  <a:pt x="-468" y="2942163"/>
+                  <a:pt x="15360" y="2781998"/>
+                  <a:pt x="0" y="2599725"/>
+                </a:cubicBezTo>
+                <a:cubicBezTo>
+                  <a:pt x="-15360" y="2417452"/>
+                  <a:pt x="14816" y="2100232"/>
+                  <a:pt x="0" y="1922713"/>
+                </a:cubicBezTo>
+                <a:cubicBezTo>
+                  <a:pt x="-14816" y="1745194"/>
+                  <a:pt x="-24648" y="1604167"/>
+                  <a:pt x="0" y="1299863"/>
+                </a:cubicBezTo>
+                <a:cubicBezTo>
+                  <a:pt x="24648" y="995559"/>
+                  <a:pt x="2182" y="279525"/>
+                  <a:pt x="0" y="0"/>
+                </a:cubicBezTo>
                 <a:close/>
               </a:path>
             </a:pathLst>
           </a:custGeom>
-          <a:solidFill>
-            <a:schemeClr val="accent1">
-              <a:alpha val="30000"/>
-            </a:schemeClr>
-          </a:solidFill>
-          <a:ln>
-            <a:noFill/>
+          <a:noFill/>
+          <a:ln w="47625" cap="rnd">
+            <a:solidFill>
+              <a:schemeClr val="accent2"/>
+            </a:solidFill>
+            <a:round/>
+            <a:extLst>
+              <a:ext uri="{C807C97D-BFC1-408E-A445-0C87EB9F89A2}">
+                <ask:lineSketchStyleProps xmlns:ask="http://schemas.microsoft.com/office/drawing/2018/sketchyshapes" sd="1219033472">
+                  <a:prstGeom prst="rect">
+                    <a:avLst/>
+                  </a:prstGeom>
+                  <ask:type>
+                    <ask:lineSketchFreehand/>
+                  </ask:type>
+                </ask:lineSketchStyleProps>
+              </a:ext>
+            </a:extLst>
           </a:ln>
         </p:spPr>
         <p:style>
@@ -4140,386 +4729,16 @@
           <a:lstStyle/>
           <a:p>
             <a:pPr algn="ctr"/>
-            <a:endParaRPr lang="en-US" dirty="0"/>
-          </a:p>
-        </p:txBody>
-      </p:sp>
-      <p:sp>
-        <p:nvSpPr>
-          <p:cNvPr id="72" name="Rectangle 71">
-            <a:extLst>
-              <a:ext uri="{FF2B5EF4-FFF2-40B4-BE49-F238E27FC236}">
-                <a16:creationId xmlns:a16="http://schemas.microsoft.com/office/drawing/2014/main" id="{29FDB030-9B49-4CED-8CCD-4D99382388AC}"/>
-              </a:ext>
-              <a:ext uri="{C183D7F6-B498-43B3-948B-1728B52AA6E4}">
-                <adec:decorative xmlns:adec="http://schemas.microsoft.com/office/drawing/2017/decorative" val="1"/>
-              </a:ext>
-            </a:extLst>
-          </p:cNvPr>
-          <p:cNvSpPr>
-            <a:spLocks noGrp="1" noRot="1" noChangeAspect="1" noMove="1" noResize="1" noEditPoints="1" noAdjustHandles="1" noChangeArrowheads="1" noChangeShapeType="1" noTextEdit="1"/>
-          </p:cNvSpPr>
-          <p:nvPr>
-            <p:extLst>
-              <p:ext uri="{386F3935-93C4-4BCD-93E2-E3B085C9AB24}">
-                <p16:designElem xmlns:p16="http://schemas.microsoft.com/office/powerpoint/2015/main" val="1"/>
-              </p:ext>
-            </p:extLst>
-          </p:nvPr>
-        </p:nvSpPr>
-        <p:spPr>
-          <a:xfrm rot="18900000" flipH="1">
-            <a:off x="891641" y="422146"/>
-            <a:ext cx="645368" cy="645368"/>
-          </a:xfrm>
-          <a:prstGeom prst="rect">
-            <a:avLst/>
-          </a:prstGeom>
-          <a:solidFill>
-            <a:schemeClr val="accent1">
-              <a:alpha val="30000"/>
-            </a:schemeClr>
-          </a:solidFill>
-          <a:ln>
-            <a:noFill/>
-          </a:ln>
-        </p:spPr>
-        <p:style>
-          <a:lnRef idx="2">
-            <a:schemeClr val="accent1">
-              <a:shade val="50000"/>
-            </a:schemeClr>
-          </a:lnRef>
-          <a:fillRef idx="1">
-            <a:schemeClr val="accent1"/>
-          </a:fillRef>
-          <a:effectRef idx="0">
-            <a:schemeClr val="accent1"/>
-          </a:effectRef>
-          <a:fontRef idx="minor">
-            <a:schemeClr val="lt1"/>
-          </a:fontRef>
-        </p:style>
-        <p:txBody>
-          <a:bodyPr rtlCol="0" anchor="ctr"/>
-          <a:lstStyle/>
-          <a:p>
-            <a:pPr algn="ctr"/>
-            <a:endParaRPr lang="en-US"/>
-          </a:p>
-        </p:txBody>
-      </p:sp>
-      <p:sp>
-        <p:nvSpPr>
-          <p:cNvPr id="74" name="Rectangle 73">
-            <a:extLst>
-              <a:ext uri="{FF2B5EF4-FFF2-40B4-BE49-F238E27FC236}">
-                <a16:creationId xmlns:a16="http://schemas.microsoft.com/office/drawing/2014/main" id="{3783CA14-24A1-485C-8B30-D6A5D87987AD}"/>
-              </a:ext>
-              <a:ext uri="{C183D7F6-B498-43B3-948B-1728B52AA6E4}">
-                <adec:decorative xmlns:adec="http://schemas.microsoft.com/office/drawing/2017/decorative" val="1"/>
-              </a:ext>
-            </a:extLst>
-          </p:cNvPr>
-          <p:cNvSpPr>
-            <a:spLocks noGrp="1" noRot="1" noChangeAspect="1" noMove="1" noResize="1" noEditPoints="1" noAdjustHandles="1" noChangeArrowheads="1" noChangeShapeType="1" noTextEdit="1"/>
-          </p:cNvSpPr>
-          <p:nvPr>
-            <p:extLst>
-              <p:ext uri="{386F3935-93C4-4BCD-93E2-E3B085C9AB24}">
-                <p16:designElem xmlns:p16="http://schemas.microsoft.com/office/powerpoint/2015/main" val="1"/>
-              </p:ext>
-            </p:extLst>
-          </p:nvPr>
-        </p:nvSpPr>
-        <p:spPr>
-          <a:xfrm rot="18900000" flipH="1">
-            <a:off x="10043482" y="655140"/>
-            <a:ext cx="687472" cy="687472"/>
-          </a:xfrm>
-          <a:prstGeom prst="rect">
-            <a:avLst/>
-          </a:prstGeom>
-          <a:solidFill>
-            <a:schemeClr val="accent4">
-              <a:alpha val="30000"/>
-            </a:schemeClr>
-          </a:solidFill>
-          <a:ln>
-            <a:noFill/>
-          </a:ln>
-        </p:spPr>
-        <p:style>
-          <a:lnRef idx="2">
-            <a:schemeClr val="accent1">
-              <a:shade val="50000"/>
-            </a:schemeClr>
-          </a:lnRef>
-          <a:fillRef idx="1">
-            <a:schemeClr val="accent1"/>
-          </a:fillRef>
-          <a:effectRef idx="0">
-            <a:schemeClr val="accent1"/>
-          </a:effectRef>
-          <a:fontRef idx="minor">
-            <a:schemeClr val="lt1"/>
-          </a:fontRef>
-        </p:style>
-        <p:txBody>
-          <a:bodyPr rtlCol="0" anchor="ctr"/>
-          <a:lstStyle/>
-          <a:p>
-            <a:pPr algn="ctr"/>
-            <a:endParaRPr lang="en-US"/>
-          </a:p>
-        </p:txBody>
-      </p:sp>
-      <p:sp>
-        <p:nvSpPr>
-          <p:cNvPr id="76" name="Freeform: Shape 75">
-            <a:extLst>
-              <a:ext uri="{FF2B5EF4-FFF2-40B4-BE49-F238E27FC236}">
-                <a16:creationId xmlns:a16="http://schemas.microsoft.com/office/drawing/2014/main" id="{9A97C86A-04D6-40F7-AE84-31AB43E6A846}"/>
-              </a:ext>
-              <a:ext uri="{C183D7F6-B498-43B3-948B-1728B52AA6E4}">
-                <adec:decorative xmlns:adec="http://schemas.microsoft.com/office/drawing/2017/decorative" val="1"/>
-              </a:ext>
-            </a:extLst>
-          </p:cNvPr>
-          <p:cNvSpPr>
-            <a:spLocks noGrp="1" noRot="1" noChangeAspect="1" noMove="1" noResize="1" noEditPoints="1" noAdjustHandles="1" noChangeArrowheads="1" noChangeShapeType="1" noTextEdit="1"/>
-          </p:cNvSpPr>
-          <p:nvPr>
-            <p:extLst>
-              <p:ext uri="{386F3935-93C4-4BCD-93E2-E3B085C9AB24}">
-                <p16:designElem xmlns:p16="http://schemas.microsoft.com/office/powerpoint/2015/main" val="1"/>
-              </p:ext>
-            </p:extLst>
-          </p:nvPr>
-        </p:nvSpPr>
-        <p:spPr>
-          <a:xfrm rot="10800000" flipH="1">
-            <a:off x="9356643" y="0"/>
-            <a:ext cx="2835357" cy="1480837"/>
-          </a:xfrm>
-          <a:custGeom>
-            <a:avLst/>
-            <a:gdLst>
-              <a:gd name="connsiteX0" fmla="*/ 2835357 w 2835357"/>
-              <a:gd name="connsiteY0" fmla="*/ 1480837 h 1480837"/>
-              <a:gd name="connsiteX1" fmla="*/ 0 w 2835357"/>
-              <a:gd name="connsiteY1" fmla="*/ 1480837 h 1480837"/>
-              <a:gd name="connsiteX2" fmla="*/ 1552727 w 2835357"/>
-              <a:gd name="connsiteY2" fmla="*/ 0 h 1480837"/>
-              <a:gd name="connsiteX3" fmla="*/ 2835357 w 2835357"/>
-              <a:gd name="connsiteY3" fmla="*/ 1223245 h 1480837"/>
-            </a:gdLst>
-            <a:ahLst/>
-            <a:cxnLst>
-              <a:cxn ang="0">
-                <a:pos x="connsiteX0" y="connsiteY0"/>
-              </a:cxn>
-              <a:cxn ang="0">
-                <a:pos x="connsiteX1" y="connsiteY1"/>
-              </a:cxn>
-              <a:cxn ang="0">
-                <a:pos x="connsiteX2" y="connsiteY2"/>
-              </a:cxn>
-              <a:cxn ang="0">
-                <a:pos x="connsiteX3" y="connsiteY3"/>
-              </a:cxn>
-            </a:cxnLst>
-            <a:rect l="l" t="t" r="r" b="b"/>
-            <a:pathLst>
-              <a:path w="2835357" h="1480837">
-                <a:moveTo>
-                  <a:pt x="2835357" y="1480837"/>
-                </a:moveTo>
-                <a:lnTo>
-                  <a:pt x="0" y="1480837"/>
-                </a:lnTo>
-                <a:lnTo>
-                  <a:pt x="1552727" y="0"/>
-                </a:lnTo>
-                <a:lnTo>
-                  <a:pt x="2835357" y="1223245"/>
-                </a:lnTo>
-                <a:close/>
-              </a:path>
-            </a:pathLst>
-          </a:custGeom>
-          <a:solidFill>
-            <a:schemeClr val="accent4">
-              <a:alpha val="30000"/>
-            </a:schemeClr>
-          </a:solidFill>
-          <a:ln>
-            <a:noFill/>
-          </a:ln>
-        </p:spPr>
-        <p:style>
-          <a:lnRef idx="2">
-            <a:schemeClr val="accent1">
-              <a:shade val="50000"/>
-            </a:schemeClr>
-          </a:lnRef>
-          <a:fillRef idx="1">
-            <a:schemeClr val="accent1"/>
-          </a:fillRef>
-          <a:effectRef idx="0">
-            <a:schemeClr val="accent1"/>
-          </a:effectRef>
-          <a:fontRef idx="minor">
-            <a:schemeClr val="lt1"/>
-          </a:fontRef>
-        </p:style>
-        <p:txBody>
-          <a:bodyPr wrap="square" rtlCol="0" anchor="ctr">
-            <a:noAutofit/>
-          </a:bodyPr>
-          <a:lstStyle/>
-          <a:p>
-            <a:pPr algn="ctr"/>
-            <a:endParaRPr lang="en-US" dirty="0"/>
-          </a:p>
-        </p:txBody>
-      </p:sp>
-      <p:sp>
-        <p:nvSpPr>
-          <p:cNvPr id="78" name="Isosceles Triangle 77">
-            <a:extLst>
-              <a:ext uri="{FF2B5EF4-FFF2-40B4-BE49-F238E27FC236}">
-                <a16:creationId xmlns:a16="http://schemas.microsoft.com/office/drawing/2014/main" id="{FF9F2414-84E8-453E-B1F3-389FDE8192D9}"/>
-              </a:ext>
-              <a:ext uri="{C183D7F6-B498-43B3-948B-1728B52AA6E4}">
-                <adec:decorative xmlns:adec="http://schemas.microsoft.com/office/drawing/2017/decorative" val="1"/>
-              </a:ext>
-            </a:extLst>
-          </p:cNvPr>
-          <p:cNvSpPr>
-            <a:spLocks noGrp="1" noRot="1" noChangeAspect="1" noMove="1" noResize="1" noEditPoints="1" noAdjustHandles="1" noChangeArrowheads="1" noChangeShapeType="1" noTextEdit="1"/>
-          </p:cNvSpPr>
-          <p:nvPr>
-            <p:extLst>
-              <p:ext uri="{386F3935-93C4-4BCD-93E2-E3B085C9AB24}">
-                <p16:designElem xmlns:p16="http://schemas.microsoft.com/office/powerpoint/2015/main" val="1"/>
-              </p:ext>
-            </p:extLst>
-          </p:nvPr>
-        </p:nvSpPr>
-        <p:spPr>
-          <a:xfrm flipH="1">
-            <a:off x="7976344" y="6115501"/>
-            <a:ext cx="1494513" cy="742499"/>
-          </a:xfrm>
-          <a:prstGeom prst="triangle">
-            <a:avLst/>
-          </a:prstGeom>
-          <a:solidFill>
-            <a:schemeClr val="accent1">
-              <a:alpha val="30000"/>
-            </a:schemeClr>
-          </a:solidFill>
-          <a:ln>
-            <a:noFill/>
-          </a:ln>
-        </p:spPr>
-        <p:style>
-          <a:lnRef idx="2">
-            <a:schemeClr val="accent1">
-              <a:shade val="50000"/>
-            </a:schemeClr>
-          </a:lnRef>
-          <a:fillRef idx="1">
-            <a:schemeClr val="accent1"/>
-          </a:fillRef>
-          <a:effectRef idx="0">
-            <a:schemeClr val="accent1"/>
-          </a:effectRef>
-          <a:fontRef idx="minor">
-            <a:schemeClr val="lt1"/>
-          </a:fontRef>
-        </p:style>
-        <p:txBody>
-          <a:bodyPr rtlCol="0" anchor="ctr"/>
-          <a:lstStyle/>
-          <a:p>
-            <a:pPr algn="ctr"/>
-            <a:endParaRPr lang="en-US"/>
-          </a:p>
-        </p:txBody>
-      </p:sp>
-      <p:sp>
-        <p:nvSpPr>
-          <p:cNvPr id="80" name="Isosceles Triangle 79">
-            <a:extLst>
-              <a:ext uri="{FF2B5EF4-FFF2-40B4-BE49-F238E27FC236}">
-                <a16:creationId xmlns:a16="http://schemas.microsoft.com/office/drawing/2014/main" id="{3ECA69A1-7536-43AC-85EF-C7106179F5ED}"/>
-              </a:ext>
-              <a:ext uri="{C183D7F6-B498-43B3-948B-1728B52AA6E4}">
-                <adec:decorative xmlns:adec="http://schemas.microsoft.com/office/drawing/2017/decorative" val="1"/>
-              </a:ext>
-            </a:extLst>
-          </p:cNvPr>
-          <p:cNvSpPr>
-            <a:spLocks noGrp="1" noRot="1" noChangeAspect="1" noMove="1" noResize="1" noEditPoints="1" noAdjustHandles="1" noChangeArrowheads="1" noChangeShapeType="1" noTextEdit="1"/>
-          </p:cNvSpPr>
-          <p:nvPr>
-            <p:extLst>
-              <p:ext uri="{386F3935-93C4-4BCD-93E2-E3B085C9AB24}">
-                <p16:designElem xmlns:p16="http://schemas.microsoft.com/office/powerpoint/2015/main" val="1"/>
-              </p:ext>
-            </p:extLst>
-          </p:nvPr>
-        </p:nvSpPr>
-        <p:spPr>
-          <a:xfrm flipH="1">
-            <a:off x="7604080" y="6453143"/>
-            <a:ext cx="814903" cy="404857"/>
-          </a:xfrm>
-          <a:prstGeom prst="triangle">
-            <a:avLst/>
-          </a:prstGeom>
-          <a:solidFill>
-            <a:schemeClr val="accent1">
-              <a:alpha val="30000"/>
-            </a:schemeClr>
-          </a:solidFill>
-          <a:ln>
-            <a:noFill/>
-          </a:ln>
-        </p:spPr>
-        <p:style>
-          <a:lnRef idx="2">
-            <a:schemeClr val="accent1">
-              <a:shade val="50000"/>
-            </a:schemeClr>
-          </a:lnRef>
-          <a:fillRef idx="1">
-            <a:schemeClr val="accent1"/>
-          </a:fillRef>
-          <a:effectRef idx="0">
-            <a:schemeClr val="accent1"/>
-          </a:effectRef>
-          <a:fontRef idx="minor">
-            <a:schemeClr val="lt1"/>
-          </a:fontRef>
-        </p:style>
-        <p:txBody>
-          <a:bodyPr rtlCol="0" anchor="ctr"/>
-          <a:lstStyle/>
-          <a:p>
-            <a:pPr algn="ctr"/>
             <a:endParaRPr lang="en-US"/>
           </a:p>
         </p:txBody>
       </p:sp>
       <p:pic>
         <p:nvPicPr>
-          <p:cNvPr id="4" name="Picture 3">
-            <a:extLst>
-              <a:ext uri="{FF2B5EF4-FFF2-40B4-BE49-F238E27FC236}">
-                <a16:creationId xmlns:a16="http://schemas.microsoft.com/office/drawing/2014/main" id="{F85E34C5-062B-0462-841A-EA85ABF661C8}"/>
+          <p:cNvPr id="4" name="Picture 3" descr="Chart&#10;&#10;Description automatically generated">
+            <a:extLst>
+              <a:ext uri="{FF2B5EF4-FFF2-40B4-BE49-F238E27FC236}">
+                <a16:creationId xmlns:a16="http://schemas.microsoft.com/office/drawing/2014/main" id="{382E60F7-86B1-5A77-BCE8-8CDA78094695}"/>
               </a:ext>
             </a:extLst>
           </p:cNvPr>
@@ -4536,8 +4755,8 @@
         </p:blipFill>
         <p:spPr>
           <a:xfrm>
-            <a:off x="1772792" y="1801125"/>
-            <a:ext cx="8646415" cy="3255749"/>
+            <a:off x="3226664" y="914400"/>
+            <a:ext cx="5662471" cy="4968819"/>
           </a:xfrm>
           <a:prstGeom prst="rect">
             <a:avLst/>
@@ -4558,72 +4777,6 @@
 </file>
 
 <file path=ppt/slides/slide3.xml><?xml version="1.0" encoding="utf-8"?>
-<p:sld xmlns:a="http://schemas.openxmlformats.org/drawingml/2006/main" xmlns:r="http://schemas.openxmlformats.org/officeDocument/2006/relationships" xmlns:p="http://schemas.openxmlformats.org/presentationml/2006/main">
-  <p:cSld>
-    <p:spTree>
-      <p:nvGrpSpPr>
-        <p:cNvPr id="1" name=""/>
-        <p:cNvGrpSpPr/>
-        <p:nvPr/>
-      </p:nvGrpSpPr>
-      <p:grpSpPr>
-        <a:xfrm>
-          <a:off x="0" y="0"/>
-          <a:ext cx="0" cy="0"/>
-          <a:chOff x="0" y="0"/>
-          <a:chExt cx="0" cy="0"/>
-        </a:xfrm>
-      </p:grpSpPr>
-      <p:pic>
-        <p:nvPicPr>
-          <p:cNvPr id="4" name="Picture 3" descr="Text&#10;&#10;Description automatically generated">
-            <a:extLst>
-              <a:ext uri="{FF2B5EF4-FFF2-40B4-BE49-F238E27FC236}">
-                <a16:creationId xmlns:a16="http://schemas.microsoft.com/office/drawing/2014/main" id="{D6BC2D67-AA49-BC54-097C-86CE52575FDD}"/>
-              </a:ext>
-            </a:extLst>
-          </p:cNvPr>
-          <p:cNvPicPr>
-            <a:picLocks noChangeAspect="1"/>
-          </p:cNvPicPr>
-          <p:nvPr/>
-        </p:nvPicPr>
-        <p:blipFill>
-          <a:blip r:embed="rId2">
-            <a:extLst>
-              <a:ext uri="{28A0092B-C50C-407E-A947-70E740481C1C}">
-                <a14:useLocalDpi xmlns:a14="http://schemas.microsoft.com/office/drawing/2010/main" val="0"/>
-              </a:ext>
-            </a:extLst>
-          </a:blip>
-          <a:stretch>
-            <a:fillRect/>
-          </a:stretch>
-        </p:blipFill>
-        <p:spPr>
-          <a:xfrm>
-            <a:off x="2772711" y="0"/>
-            <a:ext cx="6646578" cy="6858000"/>
-          </a:xfrm>
-          <a:prstGeom prst="rect">
-            <a:avLst/>
-          </a:prstGeom>
-        </p:spPr>
-      </p:pic>
-    </p:spTree>
-    <p:extLst>
-      <p:ext uri="{BB962C8B-B14F-4D97-AF65-F5344CB8AC3E}">
-        <p14:creationId xmlns:p14="http://schemas.microsoft.com/office/powerpoint/2010/main" val="430150153"/>
-      </p:ext>
-    </p:extLst>
-  </p:cSld>
-  <p:clrMapOvr>
-    <a:masterClrMapping/>
-  </p:clrMapOvr>
-</p:sld>
-</file>
-
-<file path=ppt/slides/slide4.xml><?xml version="1.0" encoding="utf-8"?>
 <p:sld xmlns:a="http://schemas.openxmlformats.org/drawingml/2006/main" xmlns:r="http://schemas.openxmlformats.org/officeDocument/2006/relationships" xmlns:p="http://schemas.openxmlformats.org/presentationml/2006/main">
   <p:cSld>
     <p:bg>
@@ -4648,12 +4801,12 @@
           <a:chExt cx="0" cy="0"/>
         </a:xfrm>
       </p:grpSpPr>
-      <p:sp useBgFill="1">
-        <p:nvSpPr>
-          <p:cNvPr id="61" name="Rectangle 60">
-            <a:extLst>
-              <a:ext uri="{FF2B5EF4-FFF2-40B4-BE49-F238E27FC236}">
-                <a16:creationId xmlns:a16="http://schemas.microsoft.com/office/drawing/2014/main" id="{C7F55EAC-550A-4BDD-9099-3F20B8FA0EBC}"/>
+      <p:sp>
+        <p:nvSpPr>
+          <p:cNvPr id="29" name="Freeform: Shape 28">
+            <a:extLst>
+              <a:ext uri="{FF2B5EF4-FFF2-40B4-BE49-F238E27FC236}">
+                <a16:creationId xmlns:a16="http://schemas.microsoft.com/office/drawing/2014/main" id="{B670DBD5-770C-4383-9F54-5B86E86BD5BB}"/>
               </a:ext>
               <a:ext uri="{C183D7F6-B498-43B3-948B-1728B52AA6E4}">
                 <adec:decorative xmlns:adec="http://schemas.microsoft.com/office/drawing/2017/decorative" val="1"/>
@@ -4673,12 +4826,117 @@
         </p:nvSpPr>
         <p:spPr>
           <a:xfrm>
-            <a:off x="0" y="0"/>
-            <a:ext cx="12192000" cy="6858000"/>
+            <a:off x="1210277" y="0"/>
+            <a:ext cx="9771446" cy="6858000"/>
           </a:xfrm>
-          <a:prstGeom prst="rect">
+          <a:custGeom>
             <a:avLst/>
-          </a:prstGeom>
+            <a:gdLst>
+              <a:gd name="connsiteX0" fmla="*/ 1422188 w 9771446"/>
+              <a:gd name="connsiteY0" fmla="*/ 0 h 6858000"/>
+              <a:gd name="connsiteX1" fmla="*/ 8349258 w 9771446"/>
+              <a:gd name="connsiteY1" fmla="*/ 0 h 6858000"/>
+              <a:gd name="connsiteX2" fmla="*/ 8502224 w 9771446"/>
+              <a:gd name="connsiteY2" fmla="*/ 159673 h 6858000"/>
+              <a:gd name="connsiteX3" fmla="*/ 9771446 w 9771446"/>
+              <a:gd name="connsiteY3" fmla="*/ 3429001 h 6858000"/>
+              <a:gd name="connsiteX4" fmla="*/ 8502224 w 9771446"/>
+              <a:gd name="connsiteY4" fmla="*/ 6698330 h 6858000"/>
+              <a:gd name="connsiteX5" fmla="*/ 8349260 w 9771446"/>
+              <a:gd name="connsiteY5" fmla="*/ 6858000 h 6858000"/>
+              <a:gd name="connsiteX6" fmla="*/ 1422186 w 9771446"/>
+              <a:gd name="connsiteY6" fmla="*/ 6858000 h 6858000"/>
+              <a:gd name="connsiteX7" fmla="*/ 1269223 w 9771446"/>
+              <a:gd name="connsiteY7" fmla="*/ 6698330 h 6858000"/>
+              <a:gd name="connsiteX8" fmla="*/ 0 w 9771446"/>
+              <a:gd name="connsiteY8" fmla="*/ 3429001 h 6858000"/>
+              <a:gd name="connsiteX9" fmla="*/ 1269223 w 9771446"/>
+              <a:gd name="connsiteY9" fmla="*/ 159673 h 6858000"/>
+            </a:gdLst>
+            <a:ahLst/>
+            <a:cxnLst>
+              <a:cxn ang="0">
+                <a:pos x="connsiteX0" y="connsiteY0"/>
+              </a:cxn>
+              <a:cxn ang="0">
+                <a:pos x="connsiteX1" y="connsiteY1"/>
+              </a:cxn>
+              <a:cxn ang="0">
+                <a:pos x="connsiteX2" y="connsiteY2"/>
+              </a:cxn>
+              <a:cxn ang="0">
+                <a:pos x="connsiteX3" y="connsiteY3"/>
+              </a:cxn>
+              <a:cxn ang="0">
+                <a:pos x="connsiteX4" y="connsiteY4"/>
+              </a:cxn>
+              <a:cxn ang="0">
+                <a:pos x="connsiteX5" y="connsiteY5"/>
+              </a:cxn>
+              <a:cxn ang="0">
+                <a:pos x="connsiteX6" y="connsiteY6"/>
+              </a:cxn>
+              <a:cxn ang="0">
+                <a:pos x="connsiteX7" y="connsiteY7"/>
+              </a:cxn>
+              <a:cxn ang="0">
+                <a:pos x="connsiteX8" y="connsiteY8"/>
+              </a:cxn>
+              <a:cxn ang="0">
+                <a:pos x="connsiteX9" y="connsiteY9"/>
+              </a:cxn>
+            </a:cxnLst>
+            <a:rect l="l" t="t" r="r" b="b"/>
+            <a:pathLst>
+              <a:path w="9771446" h="6858000">
+                <a:moveTo>
+                  <a:pt x="1422188" y="0"/>
+                </a:moveTo>
+                <a:lnTo>
+                  <a:pt x="8349258" y="0"/>
+                </a:lnTo>
+                <a:lnTo>
+                  <a:pt x="8502224" y="159673"/>
+                </a:lnTo>
+                <a:cubicBezTo>
+                  <a:pt x="9290813" y="1023162"/>
+                  <a:pt x="9771446" y="2170221"/>
+                  <a:pt x="9771446" y="3429001"/>
+                </a:cubicBezTo>
+                <a:cubicBezTo>
+                  <a:pt x="9771446" y="4687781"/>
+                  <a:pt x="9290813" y="5834840"/>
+                  <a:pt x="8502224" y="6698330"/>
+                </a:cubicBezTo>
+                <a:lnTo>
+                  <a:pt x="8349260" y="6858000"/>
+                </a:lnTo>
+                <a:lnTo>
+                  <a:pt x="1422186" y="6858000"/>
+                </a:lnTo>
+                <a:lnTo>
+                  <a:pt x="1269223" y="6698330"/>
+                </a:lnTo>
+                <a:cubicBezTo>
+                  <a:pt x="480633" y="5834840"/>
+                  <a:pt x="0" y="4687781"/>
+                  <a:pt x="0" y="3429001"/>
+                </a:cubicBezTo>
+                <a:cubicBezTo>
+                  <a:pt x="0" y="2170221"/>
+                  <a:pt x="480633" y="1023162"/>
+                  <a:pt x="1269223" y="159673"/>
+                </a:cubicBezTo>
+                <a:close/>
+              </a:path>
+            </a:pathLst>
+          </a:custGeom>
+          <a:solidFill>
+            <a:schemeClr val="bg1">
+              <a:lumMod val="85000"/>
+              <a:alpha val="62000"/>
+            </a:schemeClr>
+          </a:solidFill>
           <a:ln>
             <a:noFill/>
           </a:ln>
@@ -4700,7 +4958,9 @@
           </a:fontRef>
         </p:style>
         <p:txBody>
-          <a:bodyPr rtlCol="0" anchor="ctr"/>
+          <a:bodyPr wrap="square" rtlCol="0" anchor="ctr">
+            <a:noAutofit/>
+          </a:bodyPr>
           <a:lstStyle/>
           <a:p>
             <a:pPr algn="ctr"/>
@@ -4708,1308 +4968,92 @@
           </a:p>
         </p:txBody>
       </p:sp>
-      <p:sp>
-        <p:nvSpPr>
-          <p:cNvPr id="63" name="Freeform: Shape 62">
-            <a:extLst>
-              <a:ext uri="{FF2B5EF4-FFF2-40B4-BE49-F238E27FC236}">
-                <a16:creationId xmlns:a16="http://schemas.microsoft.com/office/drawing/2014/main" id="{DC4F5A5F-493F-49AE-89B6-D5AF5EBC8B0E}"/>
-              </a:ext>
-              <a:ext uri="{C183D7F6-B498-43B3-948B-1728B52AA6E4}">
-                <adec:decorative xmlns:adec="http://schemas.microsoft.com/office/drawing/2017/decorative" val="1"/>
-              </a:ext>
-            </a:extLst>
-          </p:cNvPr>
-          <p:cNvSpPr>
-            <a:spLocks noGrp="1" noRot="1" noChangeAspect="1" noMove="1" noResize="1" noEditPoints="1" noAdjustHandles="1" noChangeArrowheads="1" noChangeShapeType="1" noTextEdit="1"/>
-          </p:cNvSpPr>
-          <p:nvPr>
-            <p:extLst>
-              <p:ext uri="{386F3935-93C4-4BCD-93E2-E3B085C9AB24}">
-                <p16:designElem xmlns:p16="http://schemas.microsoft.com/office/powerpoint/2015/main" val="1"/>
-              </p:ext>
-            </p:extLst>
-          </p:nvPr>
-        </p:nvSpPr>
+      <p:pic>
+        <p:nvPicPr>
+          <p:cNvPr id="4" name="Picture 3" descr="Text&#10;&#10;Description automatically generated">
+            <a:extLst>
+              <a:ext uri="{FF2B5EF4-FFF2-40B4-BE49-F238E27FC236}">
+                <a16:creationId xmlns:a16="http://schemas.microsoft.com/office/drawing/2014/main" id="{0E2287F9-2086-F288-DD7F-C3BB3E0D4D48}"/>
+              </a:ext>
+            </a:extLst>
+          </p:cNvPr>
+          <p:cNvPicPr>
+            <a:picLocks noChangeAspect="1"/>
+          </p:cNvPicPr>
+          <p:nvPr/>
+        </p:nvPicPr>
+        <p:blipFill rotWithShape="1">
+          <a:blip r:embed="rId2">
+            <a:extLst>
+              <a:ext uri="{28A0092B-C50C-407E-A947-70E740481C1C}">
+                <a14:useLocalDpi xmlns:a14="http://schemas.microsoft.com/office/drawing/2010/main" val="0"/>
+              </a:ext>
+            </a:extLst>
+          </a:blip>
+          <a:srcRect r="1316" b="-1"/>
+          <a:stretch/>
+        </p:blipFill>
         <p:spPr>
           <a:xfrm>
-            <a:off x="0" y="0"/>
-            <a:ext cx="12192000" cy="6858000"/>
+            <a:off x="1460597" y="10"/>
+            <a:ext cx="9270806" cy="6857990"/>
           </a:xfrm>
           <a:custGeom>
             <a:avLst/>
-            <a:gdLst>
-              <a:gd name="connsiteX0" fmla="*/ 6724001 w 12192000"/>
-              <a:gd name="connsiteY0" fmla="*/ 434021 h 6858000"/>
-              <a:gd name="connsiteX1" fmla="*/ 6471155 w 12192000"/>
-              <a:gd name="connsiteY1" fmla="*/ 434599 h 6858000"/>
-              <a:gd name="connsiteX2" fmla="*/ 5384913 w 12192000"/>
-              <a:gd name="connsiteY2" fmla="*/ 497971 h 6858000"/>
-              <a:gd name="connsiteX3" fmla="*/ 4818280 w 12192000"/>
-              <a:gd name="connsiteY3" fmla="*/ 541802 h 6858000"/>
-              <a:gd name="connsiteX4" fmla="*/ 3965428 w 12192000"/>
-              <a:gd name="connsiteY4" fmla="*/ 675942 h 6858000"/>
-              <a:gd name="connsiteX5" fmla="*/ 3699528 w 12192000"/>
-              <a:gd name="connsiteY5" fmla="*/ 770472 h 6858000"/>
-              <a:gd name="connsiteX6" fmla="*/ 3438854 w 12192000"/>
-              <a:gd name="connsiteY6" fmla="*/ 834899 h 6858000"/>
-              <a:gd name="connsiteX7" fmla="*/ 3367443 w 12192000"/>
-              <a:gd name="connsiteY7" fmla="*/ 893518 h 6858000"/>
-              <a:gd name="connsiteX8" fmla="*/ 3467301 w 12192000"/>
-              <a:gd name="connsiteY8" fmla="*/ 953722 h 6858000"/>
-              <a:gd name="connsiteX9" fmla="*/ 3889955 w 12192000"/>
-              <a:gd name="connsiteY9" fmla="*/ 977486 h 6858000"/>
-              <a:gd name="connsiteX10" fmla="*/ 3502135 w 12192000"/>
-              <a:gd name="connsiteY10" fmla="*/ 1054062 h 6858000"/>
-              <a:gd name="connsiteX11" fmla="*/ 4072832 w 12192000"/>
-              <a:gd name="connsiteY11" fmla="*/ 1017622 h 6858000"/>
-              <a:gd name="connsiteX12" fmla="*/ 4244099 w 12192000"/>
-              <a:gd name="connsiteY12" fmla="*/ 1030825 h 6858000"/>
-              <a:gd name="connsiteX13" fmla="*/ 4095475 w 12192000"/>
-              <a:gd name="connsiteY13" fmla="*/ 1092084 h 6858000"/>
-              <a:gd name="connsiteX14" fmla="*/ 3327386 w 12192000"/>
-              <a:gd name="connsiteY14" fmla="*/ 1215660 h 6858000"/>
-              <a:gd name="connsiteX15" fmla="*/ 3254813 w 12192000"/>
-              <a:gd name="connsiteY15" fmla="*/ 1226749 h 6858000"/>
-              <a:gd name="connsiteX16" fmla="*/ 2776427 w 12192000"/>
-              <a:gd name="connsiteY16" fmla="*/ 1401552 h 6858000"/>
-              <a:gd name="connsiteX17" fmla="*/ 3063226 w 12192000"/>
-              <a:gd name="connsiteY17" fmla="*/ 1384124 h 6858000"/>
-              <a:gd name="connsiteX18" fmla="*/ 2754945 w 12192000"/>
-              <a:gd name="connsiteY18" fmla="*/ 1495025 h 6858000"/>
-              <a:gd name="connsiteX19" fmla="*/ 2381061 w 12192000"/>
-              <a:gd name="connsiteY19" fmla="*/ 1619658 h 6858000"/>
-              <a:gd name="connsiteX20" fmla="*/ 2008336 w 12192000"/>
-              <a:gd name="connsiteY20" fmla="*/ 1814527 h 6858000"/>
-              <a:gd name="connsiteX21" fmla="*/ 1740695 w 12192000"/>
-              <a:gd name="connsiteY21" fmla="*/ 1914337 h 6858000"/>
-              <a:gd name="connsiteX22" fmla="*/ 1787720 w 12192000"/>
-              <a:gd name="connsiteY22" fmla="*/ 1991970 h 6858000"/>
-              <a:gd name="connsiteX23" fmla="*/ 1754048 w 12192000"/>
-              <a:gd name="connsiteY23" fmla="*/ 2078049 h 6858000"/>
-              <a:gd name="connsiteX24" fmla="*/ 2228951 w 12192000"/>
-              <a:gd name="connsiteY24" fmla="*/ 1996721 h 6858000"/>
-              <a:gd name="connsiteX25" fmla="*/ 2054781 w 12192000"/>
-              <a:gd name="connsiteY25" fmla="*/ 2053228 h 6858000"/>
-              <a:gd name="connsiteX26" fmla="*/ 1985693 w 12192000"/>
-              <a:gd name="connsiteY26" fmla="*/ 2109207 h 6858000"/>
-              <a:gd name="connsiteX27" fmla="*/ 2061168 w 12192000"/>
-              <a:gd name="connsiteY27" fmla="*/ 2130859 h 6858000"/>
-              <a:gd name="connsiteX28" fmla="*/ 2388026 w 12192000"/>
-              <a:gd name="connsiteY28" fmla="*/ 2184726 h 6858000"/>
-              <a:gd name="connsiteX29" fmla="*/ 1560719 w 12192000"/>
-              <a:gd name="connsiteY29" fmla="*/ 2384876 h 6858000"/>
-              <a:gd name="connsiteX30" fmla="*/ 1679734 w 12192000"/>
-              <a:gd name="connsiteY30" fmla="*/ 2400191 h 6858000"/>
-              <a:gd name="connsiteX31" fmla="*/ 2882089 w 12192000"/>
-              <a:gd name="connsiteY31" fmla="*/ 2383292 h 6858000"/>
-              <a:gd name="connsiteX32" fmla="*/ 3116638 w 12192000"/>
-              <a:gd name="connsiteY32" fmla="*/ 2359528 h 6858000"/>
-              <a:gd name="connsiteX33" fmla="*/ 2897765 w 12192000"/>
-              <a:gd name="connsiteY33" fmla="*/ 2758243 h 6858000"/>
-              <a:gd name="connsiteX34" fmla="*/ 2981367 w 12192000"/>
-              <a:gd name="connsiteY34" fmla="*/ 2829008 h 6858000"/>
-              <a:gd name="connsiteX35" fmla="*/ 2682955 w 12192000"/>
-              <a:gd name="connsiteY35" fmla="*/ 2846436 h 6858000"/>
-              <a:gd name="connsiteX36" fmla="*/ 2099485 w 12192000"/>
-              <a:gd name="connsiteY36" fmla="*/ 3066653 h 6858000"/>
-              <a:gd name="connsiteX37" fmla="*/ 1807460 w 12192000"/>
-              <a:gd name="connsiteY37" fmla="*/ 3454808 h 6858000"/>
-              <a:gd name="connsiteX38" fmla="*/ 1921251 w 12192000"/>
-              <a:gd name="connsiteY38" fmla="*/ 3540889 h 6858000"/>
-              <a:gd name="connsiteX39" fmla="*/ 1453313 w 12192000"/>
-              <a:gd name="connsiteY39" fmla="*/ 3637002 h 6858000"/>
-              <a:gd name="connsiteX40" fmla="*/ 1686122 w 12192000"/>
-              <a:gd name="connsiteY40" fmla="*/ 3667634 h 6858000"/>
-              <a:gd name="connsiteX41" fmla="*/ 1513692 w 12192000"/>
-              <a:gd name="connsiteY41" fmla="*/ 3725196 h 6858000"/>
-              <a:gd name="connsiteX42" fmla="*/ 1369711 w 12192000"/>
-              <a:gd name="connsiteY42" fmla="*/ 3826063 h 6858000"/>
-              <a:gd name="connsiteX43" fmla="*/ 2051298 w 12192000"/>
-              <a:gd name="connsiteY43" fmla="*/ 3754242 h 6858000"/>
-              <a:gd name="connsiteX44" fmla="*/ 2245207 w 12192000"/>
-              <a:gd name="connsiteY44" fmla="*/ 3797018 h 6858000"/>
-              <a:gd name="connsiteX45" fmla="*/ 2353192 w 12192000"/>
-              <a:gd name="connsiteY45" fmla="*/ 3796489 h 6858000"/>
-              <a:gd name="connsiteX46" fmla="*/ 2490207 w 12192000"/>
-              <a:gd name="connsiteY46" fmla="*/ 3801242 h 6858000"/>
-              <a:gd name="connsiteX47" fmla="*/ 2375835 w 12192000"/>
-              <a:gd name="connsiteY47" fmla="*/ 3839794 h 6858000"/>
-              <a:gd name="connsiteX48" fmla="*/ 2522138 w 12192000"/>
-              <a:gd name="connsiteY48" fmla="*/ 4009841 h 6858000"/>
-              <a:gd name="connsiteX49" fmla="*/ 1998466 w 12192000"/>
-              <a:gd name="connsiteY49" fmla="*/ 4130778 h 6858000"/>
-              <a:gd name="connsiteX50" fmla="*/ 2114580 w 12192000"/>
-              <a:gd name="connsiteY50" fmla="*/ 4154543 h 6858000"/>
-              <a:gd name="connsiteX51" fmla="*/ 2177862 w 12192000"/>
-              <a:gd name="connsiteY51" fmla="*/ 4189925 h 6858000"/>
-              <a:gd name="connsiteX52" fmla="*/ 1868419 w 12192000"/>
-              <a:gd name="connsiteY52" fmla="*/ 4382153 h 6858000"/>
-              <a:gd name="connsiteX53" fmla="*/ 2279460 w 12192000"/>
-              <a:gd name="connsiteY53" fmla="*/ 4356805 h 6858000"/>
-              <a:gd name="connsiteX54" fmla="*/ 2029817 w 12192000"/>
-              <a:gd name="connsiteY54" fmla="*/ 4468235 h 6858000"/>
-              <a:gd name="connsiteX55" fmla="*/ 1560137 w 12192000"/>
-              <a:gd name="connsiteY55" fmla="*/ 4730172 h 6858000"/>
-              <a:gd name="connsiteX56" fmla="*/ 1956664 w 12192000"/>
-              <a:gd name="connsiteY56" fmla="*/ 4820477 h 6858000"/>
-              <a:gd name="connsiteX57" fmla="*/ 3268168 w 12192000"/>
-              <a:gd name="connsiteY57" fmla="*/ 4852692 h 6858000"/>
-              <a:gd name="connsiteX58" fmla="*/ 2807197 w 12192000"/>
-              <a:gd name="connsiteY58" fmla="*/ 4939300 h 6858000"/>
-              <a:gd name="connsiteX59" fmla="*/ 2721272 w 12192000"/>
-              <a:gd name="connsiteY59" fmla="*/ 4970458 h 6858000"/>
-              <a:gd name="connsiteX60" fmla="*/ 2802552 w 12192000"/>
-              <a:gd name="connsiteY60" fmla="*/ 5014291 h 6858000"/>
-              <a:gd name="connsiteX61" fmla="*/ 2537812 w 12192000"/>
-              <a:gd name="connsiteY61" fmla="*/ 5053898 h 6858000"/>
-              <a:gd name="connsiteX62" fmla="*/ 2569744 w 12192000"/>
-              <a:gd name="connsiteY62" fmla="*/ 5153182 h 6858000"/>
-              <a:gd name="connsiteX63" fmla="*/ 1987436 w 12192000"/>
-              <a:gd name="connsiteY63" fmla="*/ 5334320 h 6858000"/>
-              <a:gd name="connsiteX64" fmla="*/ 1972921 w 12192000"/>
-              <a:gd name="connsiteY64" fmla="*/ 5382376 h 6858000"/>
-              <a:gd name="connsiteX65" fmla="*/ 2341001 w 12192000"/>
-              <a:gd name="connsiteY65" fmla="*/ 5360725 h 6858000"/>
-              <a:gd name="connsiteX66" fmla="*/ 2710822 w 12192000"/>
-              <a:gd name="connsiteY66" fmla="*/ 5418816 h 6858000"/>
-              <a:gd name="connsiteX67" fmla="*/ 2833903 w 12192000"/>
-              <a:gd name="connsiteY67" fmla="*/ 5413007 h 6858000"/>
-              <a:gd name="connsiteX68" fmla="*/ 3011556 w 12192000"/>
-              <a:gd name="connsiteY68" fmla="*/ 5399276 h 6858000"/>
-              <a:gd name="connsiteX69" fmla="*/ 3254233 w 12192000"/>
-              <a:gd name="connsiteY69" fmla="*/ 5439412 h 6858000"/>
-              <a:gd name="connsiteX70" fmla="*/ 2792101 w 12192000"/>
-              <a:gd name="connsiteY70" fmla="*/ 5471625 h 6858000"/>
-              <a:gd name="connsiteX71" fmla="*/ 2977303 w 12192000"/>
-              <a:gd name="connsiteY71" fmla="*/ 5539751 h 6858000"/>
-              <a:gd name="connsiteX72" fmla="*/ 3656566 w 12192000"/>
-              <a:gd name="connsiteY72" fmla="*/ 5678642 h 6858000"/>
-              <a:gd name="connsiteX73" fmla="*/ 4858340 w 12192000"/>
-              <a:gd name="connsiteY73" fmla="*/ 5969625 h 6858000"/>
-              <a:gd name="connsiteX74" fmla="*/ 5296668 w 12192000"/>
-              <a:gd name="connsiteY74" fmla="*/ 6043559 h 6858000"/>
-              <a:gd name="connsiteX75" fmla="*/ 5456323 w 12192000"/>
-              <a:gd name="connsiteY75" fmla="*/ 6042502 h 6858000"/>
-              <a:gd name="connsiteX76" fmla="*/ 5267058 w 12192000"/>
-              <a:gd name="connsiteY76" fmla="*/ 6100066 h 6858000"/>
-              <a:gd name="connsiteX77" fmla="*/ 7095266 w 12192000"/>
-              <a:gd name="connsiteY77" fmla="*/ 6287541 h 6858000"/>
-              <a:gd name="connsiteX78" fmla="*/ 9707235 w 12192000"/>
-              <a:gd name="connsiteY78" fmla="*/ 5994446 h 6858000"/>
-              <a:gd name="connsiteX79" fmla="*/ 10083442 w 12192000"/>
-              <a:gd name="connsiteY79" fmla="*/ 5678642 h 6858000"/>
-              <a:gd name="connsiteX80" fmla="*/ 10338892 w 12192000"/>
-              <a:gd name="connsiteY80" fmla="*/ 4650957 h 6858000"/>
-              <a:gd name="connsiteX81" fmla="*/ 10628013 w 12192000"/>
-              <a:gd name="connsiteY81" fmla="*/ 4411198 h 6858000"/>
-              <a:gd name="connsiteX82" fmla="*/ 10802766 w 12192000"/>
-              <a:gd name="connsiteY82" fmla="*/ 4258050 h 6858000"/>
-              <a:gd name="connsiteX83" fmla="*/ 10614662 w 12192000"/>
-              <a:gd name="connsiteY83" fmla="*/ 4150318 h 6858000"/>
-              <a:gd name="connsiteX84" fmla="*/ 10681427 w 12192000"/>
-              <a:gd name="connsiteY84" fmla="*/ 4054203 h 6858000"/>
-              <a:gd name="connsiteX85" fmla="*/ 10520029 w 12192000"/>
-              <a:gd name="connsiteY85" fmla="*/ 3804411 h 6858000"/>
-              <a:gd name="connsiteX86" fmla="*/ 10568798 w 12192000"/>
-              <a:gd name="connsiteY86" fmla="*/ 3466426 h 6858000"/>
-              <a:gd name="connsiteX87" fmla="*/ 10499709 w 12192000"/>
-              <a:gd name="connsiteY87" fmla="*/ 3166465 h 6858000"/>
-              <a:gd name="connsiteX88" fmla="*/ 10489840 w 12192000"/>
-              <a:gd name="connsiteY88" fmla="*/ 2546475 h 6858000"/>
-              <a:gd name="connsiteX89" fmla="*/ 10584471 w 12192000"/>
-              <a:gd name="connsiteY89" fmla="*/ 2512148 h 6858000"/>
-              <a:gd name="connsiteX90" fmla="*/ 10695942 w 12192000"/>
-              <a:gd name="connsiteY90" fmla="*/ 2358471 h 6858000"/>
-              <a:gd name="connsiteX91" fmla="*/ 10732516 w 12192000"/>
-              <a:gd name="connsiteY91" fmla="*/ 2287706 h 6858000"/>
-              <a:gd name="connsiteX92" fmla="*/ 10731357 w 12192000"/>
-              <a:gd name="connsiteY92" fmla="*/ 2137725 h 6858000"/>
-              <a:gd name="connsiteX93" fmla="*/ 10678525 w 12192000"/>
-              <a:gd name="connsiteY93" fmla="*/ 2070656 h 6858000"/>
-              <a:gd name="connsiteX94" fmla="*/ 10735999 w 12192000"/>
-              <a:gd name="connsiteY94" fmla="*/ 1956587 h 6858000"/>
-              <a:gd name="connsiteX95" fmla="*/ 10824246 w 12192000"/>
-              <a:gd name="connsiteY95" fmla="*/ 1862584 h 6858000"/>
-              <a:gd name="connsiteX96" fmla="*/ 10773156 w 12192000"/>
-              <a:gd name="connsiteY96" fmla="*/ 1768054 h 6858000"/>
-              <a:gd name="connsiteX97" fmla="*/ 10716261 w 12192000"/>
-              <a:gd name="connsiteY97" fmla="*/ 1678278 h 6858000"/>
-              <a:gd name="connsiteX98" fmla="*/ 10554864 w 12192000"/>
-              <a:gd name="connsiteY98" fmla="*/ 1477599 h 6858000"/>
-              <a:gd name="connsiteX99" fmla="*/ 10267483 w 12192000"/>
-              <a:gd name="connsiteY99" fmla="*/ 1324977 h 6858000"/>
-              <a:gd name="connsiteX100" fmla="*/ 9913337 w 12192000"/>
-              <a:gd name="connsiteY100" fmla="*/ 1202458 h 6858000"/>
-              <a:gd name="connsiteX101" fmla="*/ 10024805 w 12192000"/>
-              <a:gd name="connsiteY101" fmla="*/ 1124827 h 6858000"/>
-              <a:gd name="connsiteX102" fmla="*/ 9411726 w 12192000"/>
-              <a:gd name="connsiteY102" fmla="*/ 980655 h 6858000"/>
-              <a:gd name="connsiteX103" fmla="*/ 9930753 w 12192000"/>
-              <a:gd name="connsiteY103" fmla="*/ 901968 h 6858000"/>
-              <a:gd name="connsiteX104" fmla="*/ 9894178 w 12192000"/>
-              <a:gd name="connsiteY104" fmla="*/ 871339 h 6858000"/>
-              <a:gd name="connsiteX105" fmla="*/ 9858182 w 12192000"/>
-              <a:gd name="connsiteY105" fmla="*/ 839125 h 6858000"/>
-              <a:gd name="connsiteX106" fmla="*/ 10131050 w 12192000"/>
-              <a:gd name="connsiteY106" fmla="*/ 792652 h 6858000"/>
-              <a:gd name="connsiteX107" fmla="*/ 10006808 w 12192000"/>
-              <a:gd name="connsiteY107" fmla="*/ 731920 h 6858000"/>
-              <a:gd name="connsiteX108" fmla="*/ 10233809 w 12192000"/>
-              <a:gd name="connsiteY108" fmla="*/ 710268 h 6858000"/>
-              <a:gd name="connsiteX109" fmla="*/ 10267483 w 12192000"/>
-              <a:gd name="connsiteY109" fmla="*/ 628940 h 6858000"/>
-              <a:gd name="connsiteX110" fmla="*/ 10136275 w 12192000"/>
-              <a:gd name="connsiteY110" fmla="*/ 589333 h 6858000"/>
-              <a:gd name="connsiteX111" fmla="*/ 9131312 w 12192000"/>
-              <a:gd name="connsiteY111" fmla="*/ 480544 h 6858000"/>
-              <a:gd name="connsiteX112" fmla="*/ 7479600 w 12192000"/>
-              <a:gd name="connsiteY112" fmla="*/ 454667 h 6858000"/>
-              <a:gd name="connsiteX113" fmla="*/ 6724001 w 12192000"/>
-              <a:gd name="connsiteY113" fmla="*/ 434021 h 6858000"/>
-              <a:gd name="connsiteX114" fmla="*/ 0 w 12192000"/>
-              <a:gd name="connsiteY114" fmla="*/ 0 h 6858000"/>
-              <a:gd name="connsiteX115" fmla="*/ 12192000 w 12192000"/>
-              <a:gd name="connsiteY115" fmla="*/ 0 h 6858000"/>
-              <a:gd name="connsiteX116" fmla="*/ 12192000 w 12192000"/>
-              <a:gd name="connsiteY116" fmla="*/ 6858000 h 6858000"/>
-              <a:gd name="connsiteX117" fmla="*/ 0 w 12192000"/>
-              <a:gd name="connsiteY117" fmla="*/ 6858000 h 6858000"/>
-            </a:gdLst>
+            <a:gdLst/>
             <a:ahLst/>
-            <a:cxnLst>
-              <a:cxn ang="0">
-                <a:pos x="connsiteX0" y="connsiteY0"/>
-              </a:cxn>
-              <a:cxn ang="0">
-                <a:pos x="connsiteX1" y="connsiteY1"/>
-              </a:cxn>
-              <a:cxn ang="0">
-                <a:pos x="connsiteX2" y="connsiteY2"/>
-              </a:cxn>
-              <a:cxn ang="0">
-                <a:pos x="connsiteX3" y="connsiteY3"/>
-              </a:cxn>
-              <a:cxn ang="0">
-                <a:pos x="connsiteX4" y="connsiteY4"/>
-              </a:cxn>
-              <a:cxn ang="0">
-                <a:pos x="connsiteX5" y="connsiteY5"/>
-              </a:cxn>
-              <a:cxn ang="0">
-                <a:pos x="connsiteX6" y="connsiteY6"/>
-              </a:cxn>
-              <a:cxn ang="0">
-                <a:pos x="connsiteX7" y="connsiteY7"/>
-              </a:cxn>
-              <a:cxn ang="0">
-                <a:pos x="connsiteX8" y="connsiteY8"/>
-              </a:cxn>
-              <a:cxn ang="0">
-                <a:pos x="connsiteX9" y="connsiteY9"/>
-              </a:cxn>
-              <a:cxn ang="0">
-                <a:pos x="connsiteX10" y="connsiteY10"/>
-              </a:cxn>
-              <a:cxn ang="0">
-                <a:pos x="connsiteX11" y="connsiteY11"/>
-              </a:cxn>
-              <a:cxn ang="0">
-                <a:pos x="connsiteX12" y="connsiteY12"/>
-              </a:cxn>
-              <a:cxn ang="0">
-                <a:pos x="connsiteX13" y="connsiteY13"/>
-              </a:cxn>
-              <a:cxn ang="0">
-                <a:pos x="connsiteX14" y="connsiteY14"/>
-              </a:cxn>
-              <a:cxn ang="0">
-                <a:pos x="connsiteX15" y="connsiteY15"/>
-              </a:cxn>
-              <a:cxn ang="0">
-                <a:pos x="connsiteX16" y="connsiteY16"/>
-              </a:cxn>
-              <a:cxn ang="0">
-                <a:pos x="connsiteX17" y="connsiteY17"/>
-              </a:cxn>
-              <a:cxn ang="0">
-                <a:pos x="connsiteX18" y="connsiteY18"/>
-              </a:cxn>
-              <a:cxn ang="0">
-                <a:pos x="connsiteX19" y="connsiteY19"/>
-              </a:cxn>
-              <a:cxn ang="0">
-                <a:pos x="connsiteX20" y="connsiteY20"/>
-              </a:cxn>
-              <a:cxn ang="0">
-                <a:pos x="connsiteX21" y="connsiteY21"/>
-              </a:cxn>
-              <a:cxn ang="0">
-                <a:pos x="connsiteX22" y="connsiteY22"/>
-              </a:cxn>
-              <a:cxn ang="0">
-                <a:pos x="connsiteX23" y="connsiteY23"/>
-              </a:cxn>
-              <a:cxn ang="0">
-                <a:pos x="connsiteX24" y="connsiteY24"/>
-              </a:cxn>
-              <a:cxn ang="0">
-                <a:pos x="connsiteX25" y="connsiteY25"/>
-              </a:cxn>
-              <a:cxn ang="0">
-                <a:pos x="connsiteX26" y="connsiteY26"/>
-              </a:cxn>
-              <a:cxn ang="0">
-                <a:pos x="connsiteX27" y="connsiteY27"/>
-              </a:cxn>
-              <a:cxn ang="0">
-                <a:pos x="connsiteX28" y="connsiteY28"/>
-              </a:cxn>
-              <a:cxn ang="0">
-                <a:pos x="connsiteX29" y="connsiteY29"/>
-              </a:cxn>
-              <a:cxn ang="0">
-                <a:pos x="connsiteX30" y="connsiteY30"/>
-              </a:cxn>
-              <a:cxn ang="0">
-                <a:pos x="connsiteX31" y="connsiteY31"/>
-              </a:cxn>
-              <a:cxn ang="0">
-                <a:pos x="connsiteX32" y="connsiteY32"/>
-              </a:cxn>
-              <a:cxn ang="0">
-                <a:pos x="connsiteX33" y="connsiteY33"/>
-              </a:cxn>
-              <a:cxn ang="0">
-                <a:pos x="connsiteX34" y="connsiteY34"/>
-              </a:cxn>
-              <a:cxn ang="0">
-                <a:pos x="connsiteX35" y="connsiteY35"/>
-              </a:cxn>
-              <a:cxn ang="0">
-                <a:pos x="connsiteX36" y="connsiteY36"/>
-              </a:cxn>
-              <a:cxn ang="0">
-                <a:pos x="connsiteX37" y="connsiteY37"/>
-              </a:cxn>
-              <a:cxn ang="0">
-                <a:pos x="connsiteX38" y="connsiteY38"/>
-              </a:cxn>
-              <a:cxn ang="0">
-                <a:pos x="connsiteX39" y="connsiteY39"/>
-              </a:cxn>
-              <a:cxn ang="0">
-                <a:pos x="connsiteX40" y="connsiteY40"/>
-              </a:cxn>
-              <a:cxn ang="0">
-                <a:pos x="connsiteX41" y="connsiteY41"/>
-              </a:cxn>
-              <a:cxn ang="0">
-                <a:pos x="connsiteX42" y="connsiteY42"/>
-              </a:cxn>
-              <a:cxn ang="0">
-                <a:pos x="connsiteX43" y="connsiteY43"/>
-              </a:cxn>
-              <a:cxn ang="0">
-                <a:pos x="connsiteX44" y="connsiteY44"/>
-              </a:cxn>
-              <a:cxn ang="0">
-                <a:pos x="connsiteX45" y="connsiteY45"/>
-              </a:cxn>
-              <a:cxn ang="0">
-                <a:pos x="connsiteX46" y="connsiteY46"/>
-              </a:cxn>
-              <a:cxn ang="0">
-                <a:pos x="connsiteX47" y="connsiteY47"/>
-              </a:cxn>
-              <a:cxn ang="0">
-                <a:pos x="connsiteX48" y="connsiteY48"/>
-              </a:cxn>
-              <a:cxn ang="0">
-                <a:pos x="connsiteX49" y="connsiteY49"/>
-              </a:cxn>
-              <a:cxn ang="0">
-                <a:pos x="connsiteX50" y="connsiteY50"/>
-              </a:cxn>
-              <a:cxn ang="0">
-                <a:pos x="connsiteX51" y="connsiteY51"/>
-              </a:cxn>
-              <a:cxn ang="0">
-                <a:pos x="connsiteX52" y="connsiteY52"/>
-              </a:cxn>
-              <a:cxn ang="0">
-                <a:pos x="connsiteX53" y="connsiteY53"/>
-              </a:cxn>
-              <a:cxn ang="0">
-                <a:pos x="connsiteX54" y="connsiteY54"/>
-              </a:cxn>
-              <a:cxn ang="0">
-                <a:pos x="connsiteX55" y="connsiteY55"/>
-              </a:cxn>
-              <a:cxn ang="0">
-                <a:pos x="connsiteX56" y="connsiteY56"/>
-              </a:cxn>
-              <a:cxn ang="0">
-                <a:pos x="connsiteX57" y="connsiteY57"/>
-              </a:cxn>
-              <a:cxn ang="0">
-                <a:pos x="connsiteX58" y="connsiteY58"/>
-              </a:cxn>
-              <a:cxn ang="0">
-                <a:pos x="connsiteX59" y="connsiteY59"/>
-              </a:cxn>
-              <a:cxn ang="0">
-                <a:pos x="connsiteX60" y="connsiteY60"/>
-              </a:cxn>
-              <a:cxn ang="0">
-                <a:pos x="connsiteX61" y="connsiteY61"/>
-              </a:cxn>
-              <a:cxn ang="0">
-                <a:pos x="connsiteX62" y="connsiteY62"/>
-              </a:cxn>
-              <a:cxn ang="0">
-                <a:pos x="connsiteX63" y="connsiteY63"/>
-              </a:cxn>
-              <a:cxn ang="0">
-                <a:pos x="connsiteX64" y="connsiteY64"/>
-              </a:cxn>
-              <a:cxn ang="0">
-                <a:pos x="connsiteX65" y="connsiteY65"/>
-              </a:cxn>
-              <a:cxn ang="0">
-                <a:pos x="connsiteX66" y="connsiteY66"/>
-              </a:cxn>
-              <a:cxn ang="0">
-                <a:pos x="connsiteX67" y="connsiteY67"/>
-              </a:cxn>
-              <a:cxn ang="0">
-                <a:pos x="connsiteX68" y="connsiteY68"/>
-              </a:cxn>
-              <a:cxn ang="0">
-                <a:pos x="connsiteX69" y="connsiteY69"/>
-              </a:cxn>
-              <a:cxn ang="0">
-                <a:pos x="connsiteX70" y="connsiteY70"/>
-              </a:cxn>
-              <a:cxn ang="0">
-                <a:pos x="connsiteX71" y="connsiteY71"/>
-              </a:cxn>
-              <a:cxn ang="0">
-                <a:pos x="connsiteX72" y="connsiteY72"/>
-              </a:cxn>
-              <a:cxn ang="0">
-                <a:pos x="connsiteX73" y="connsiteY73"/>
-              </a:cxn>
-              <a:cxn ang="0">
-                <a:pos x="connsiteX74" y="connsiteY74"/>
-              </a:cxn>
-              <a:cxn ang="0">
-                <a:pos x="connsiteX75" y="connsiteY75"/>
-              </a:cxn>
-              <a:cxn ang="0">
-                <a:pos x="connsiteX76" y="connsiteY76"/>
-              </a:cxn>
-              <a:cxn ang="0">
-                <a:pos x="connsiteX77" y="connsiteY77"/>
-              </a:cxn>
-              <a:cxn ang="0">
-                <a:pos x="connsiteX78" y="connsiteY78"/>
-              </a:cxn>
-              <a:cxn ang="0">
-                <a:pos x="connsiteX79" y="connsiteY79"/>
-              </a:cxn>
-              <a:cxn ang="0">
-                <a:pos x="connsiteX80" y="connsiteY80"/>
-              </a:cxn>
-              <a:cxn ang="0">
-                <a:pos x="connsiteX81" y="connsiteY81"/>
-              </a:cxn>
-              <a:cxn ang="0">
-                <a:pos x="connsiteX82" y="connsiteY82"/>
-              </a:cxn>
-              <a:cxn ang="0">
-                <a:pos x="connsiteX83" y="connsiteY83"/>
-              </a:cxn>
-              <a:cxn ang="0">
-                <a:pos x="connsiteX84" y="connsiteY84"/>
-              </a:cxn>
-              <a:cxn ang="0">
-                <a:pos x="connsiteX85" y="connsiteY85"/>
-              </a:cxn>
-              <a:cxn ang="0">
-                <a:pos x="connsiteX86" y="connsiteY86"/>
-              </a:cxn>
-              <a:cxn ang="0">
-                <a:pos x="connsiteX87" y="connsiteY87"/>
-              </a:cxn>
-              <a:cxn ang="0">
-                <a:pos x="connsiteX88" y="connsiteY88"/>
-              </a:cxn>
-              <a:cxn ang="0">
-                <a:pos x="connsiteX89" y="connsiteY89"/>
-              </a:cxn>
-              <a:cxn ang="0">
-                <a:pos x="connsiteX90" y="connsiteY90"/>
-              </a:cxn>
-              <a:cxn ang="0">
-                <a:pos x="connsiteX91" y="connsiteY91"/>
-              </a:cxn>
-              <a:cxn ang="0">
-                <a:pos x="connsiteX92" y="connsiteY92"/>
-              </a:cxn>
-              <a:cxn ang="0">
-                <a:pos x="connsiteX93" y="connsiteY93"/>
-              </a:cxn>
-              <a:cxn ang="0">
-                <a:pos x="connsiteX94" y="connsiteY94"/>
-              </a:cxn>
-              <a:cxn ang="0">
-                <a:pos x="connsiteX95" y="connsiteY95"/>
-              </a:cxn>
-              <a:cxn ang="0">
-                <a:pos x="connsiteX96" y="connsiteY96"/>
-              </a:cxn>
-              <a:cxn ang="0">
-                <a:pos x="connsiteX97" y="connsiteY97"/>
-              </a:cxn>
-              <a:cxn ang="0">
-                <a:pos x="connsiteX98" y="connsiteY98"/>
-              </a:cxn>
-              <a:cxn ang="0">
-                <a:pos x="connsiteX99" y="connsiteY99"/>
-              </a:cxn>
-              <a:cxn ang="0">
-                <a:pos x="connsiteX100" y="connsiteY100"/>
-              </a:cxn>
-              <a:cxn ang="0">
-                <a:pos x="connsiteX101" y="connsiteY101"/>
-              </a:cxn>
-              <a:cxn ang="0">
-                <a:pos x="connsiteX102" y="connsiteY102"/>
-              </a:cxn>
-              <a:cxn ang="0">
-                <a:pos x="connsiteX103" y="connsiteY103"/>
-              </a:cxn>
-              <a:cxn ang="0">
-                <a:pos x="connsiteX104" y="connsiteY104"/>
-              </a:cxn>
-              <a:cxn ang="0">
-                <a:pos x="connsiteX105" y="connsiteY105"/>
-              </a:cxn>
-              <a:cxn ang="0">
-                <a:pos x="connsiteX106" y="connsiteY106"/>
-              </a:cxn>
-              <a:cxn ang="0">
-                <a:pos x="connsiteX107" y="connsiteY107"/>
-              </a:cxn>
-              <a:cxn ang="0">
-                <a:pos x="connsiteX108" y="connsiteY108"/>
-              </a:cxn>
-              <a:cxn ang="0">
-                <a:pos x="connsiteX109" y="connsiteY109"/>
-              </a:cxn>
-              <a:cxn ang="0">
-                <a:pos x="connsiteX110" y="connsiteY110"/>
-              </a:cxn>
-              <a:cxn ang="0">
-                <a:pos x="connsiteX111" y="connsiteY111"/>
-              </a:cxn>
-              <a:cxn ang="0">
-                <a:pos x="connsiteX112" y="connsiteY112"/>
-              </a:cxn>
-              <a:cxn ang="0">
-                <a:pos x="connsiteX113" y="connsiteY113"/>
-              </a:cxn>
-              <a:cxn ang="0">
-                <a:pos x="connsiteX114" y="connsiteY114"/>
-              </a:cxn>
-              <a:cxn ang="0">
-                <a:pos x="connsiteX115" y="connsiteY115"/>
-              </a:cxn>
-              <a:cxn ang="0">
-                <a:pos x="connsiteX116" y="connsiteY116"/>
-              </a:cxn>
-              <a:cxn ang="0">
-                <a:pos x="connsiteX117" y="connsiteY117"/>
-              </a:cxn>
-            </a:cxnLst>
+            <a:cxnLst/>
             <a:rect l="l" t="t" r="r" b="b"/>
             <a:pathLst>
-              <a:path w="12192000" h="6858000">
+              <a:path w="9270806" h="6858000">
                 <a:moveTo>
-                  <a:pt x="6724001" y="434021"/>
-                </a:moveTo>
-                <a:cubicBezTo>
-                  <a:pt x="6639882" y="433113"/>
-                  <a:pt x="6555627" y="433147"/>
-                  <a:pt x="6471155" y="434599"/>
-                </a:cubicBezTo>
-                <a:cubicBezTo>
-                  <a:pt x="6109461" y="440937"/>
-                  <a:pt x="5748349" y="439351"/>
-                  <a:pt x="5384913" y="497971"/>
-                </a:cubicBezTo>
-                <a:cubicBezTo>
-                  <a:pt x="5199132" y="528072"/>
-                  <a:pt x="5005803" y="518038"/>
-                  <a:pt x="4818280" y="541802"/>
-                </a:cubicBezTo>
-                <a:cubicBezTo>
-                  <a:pt x="4532641" y="578242"/>
-                  <a:pt x="4247003" y="621019"/>
-                  <a:pt x="3965428" y="675942"/>
-                </a:cubicBezTo>
-                <a:cubicBezTo>
-                  <a:pt x="3877181" y="693369"/>
-                  <a:pt x="3768034" y="703930"/>
-                  <a:pt x="3699528" y="770472"/>
-                </a:cubicBezTo>
-                <a:cubicBezTo>
-                  <a:pt x="3590961" y="728224"/>
-                  <a:pt x="3523617" y="807966"/>
-                  <a:pt x="3438854" y="834899"/>
-                </a:cubicBezTo>
-                <a:cubicBezTo>
-                  <a:pt x="3405761" y="845462"/>
-                  <a:pt x="3362218" y="860248"/>
-                  <a:pt x="3367443" y="893518"/>
-                </a:cubicBezTo>
-                <a:cubicBezTo>
-                  <a:pt x="3372089" y="935238"/>
-                  <a:pt x="3420855" y="962172"/>
-                  <a:pt x="3467301" y="953722"/>
-                </a:cubicBezTo>
-                <a:cubicBezTo>
-                  <a:pt x="3611863" y="927317"/>
-                  <a:pt x="3741328" y="986464"/>
-                  <a:pt x="3889955" y="977486"/>
-                </a:cubicBezTo>
-                <a:cubicBezTo>
-                  <a:pt x="3760488" y="1002836"/>
-                  <a:pt x="3631601" y="1028713"/>
-                  <a:pt x="3502135" y="1054062"/>
-                </a:cubicBezTo>
-                <a:cubicBezTo>
-                  <a:pt x="3694303" y="1074129"/>
-                  <a:pt x="3883568" y="1038218"/>
-                  <a:pt x="4072832" y="1017622"/>
-                </a:cubicBezTo>
-                <a:cubicBezTo>
-                  <a:pt x="4133792" y="1011285"/>
-                  <a:pt x="4228424" y="962699"/>
-                  <a:pt x="4244099" y="1030825"/>
-                </a:cubicBezTo>
-                <a:cubicBezTo>
-                  <a:pt x="4254550" y="1076242"/>
-                  <a:pt x="4152951" y="1079410"/>
-                  <a:pt x="4095475" y="1092084"/>
-                </a:cubicBezTo>
-                <a:cubicBezTo>
-                  <a:pt x="3841766" y="1146479"/>
-                  <a:pt x="3583994" y="1178165"/>
-                  <a:pt x="3327386" y="1215660"/>
-                </a:cubicBezTo>
-                <a:cubicBezTo>
-                  <a:pt x="3303001" y="1219357"/>
-                  <a:pt x="3271070" y="1216188"/>
-                  <a:pt x="3254813" y="1226749"/>
-                </a:cubicBezTo>
-                <a:cubicBezTo>
-                  <a:pt x="3123605" y="1311774"/>
-                  <a:pt x="2957563" y="1339765"/>
-                  <a:pt x="2776427" y="1401552"/>
-                </a:cubicBezTo>
-                <a:cubicBezTo>
-                  <a:pt x="2890798" y="1430598"/>
-                  <a:pt x="2968012" y="1370921"/>
-                  <a:pt x="3063226" y="1384124"/>
-                </a:cubicBezTo>
-                <a:cubicBezTo>
-                  <a:pt x="2966272" y="1448024"/>
-                  <a:pt x="2853641" y="1460171"/>
-                  <a:pt x="2754945" y="1495025"/>
-                </a:cubicBezTo>
-                <a:cubicBezTo>
-                  <a:pt x="2684117" y="1519846"/>
-                  <a:pt x="2421119" y="1597477"/>
-                  <a:pt x="2381061" y="1619658"/>
-                </a:cubicBezTo>
-                <a:cubicBezTo>
-                  <a:pt x="2260302" y="1688311"/>
-                  <a:pt x="2107033" y="1720525"/>
-                  <a:pt x="2008336" y="1814527"/>
-                </a:cubicBezTo>
-                <a:cubicBezTo>
-                  <a:pt x="1938668" y="1880540"/>
-                  <a:pt x="1822554" y="1868393"/>
-                  <a:pt x="1740695" y="1914337"/>
-                </a:cubicBezTo>
-                <a:cubicBezTo>
-                  <a:pt x="1711667" y="1957642"/>
-                  <a:pt x="1767982" y="1968733"/>
-                  <a:pt x="1787720" y="1991970"/>
-                </a:cubicBezTo>
-                <a:cubicBezTo>
-                  <a:pt x="1813846" y="2023126"/>
-                  <a:pt x="1767401" y="2040555"/>
-                  <a:pt x="1754048" y="2078049"/>
-                </a:cubicBezTo>
-                <a:cubicBezTo>
-                  <a:pt x="1907898" y="2035802"/>
-                  <a:pt x="2054781" y="2010981"/>
-                  <a:pt x="2228951" y="1996721"/>
-                </a:cubicBezTo>
-                <a:cubicBezTo>
-                  <a:pt x="2171475" y="2057452"/>
-                  <a:pt x="2101807" y="2031048"/>
-                  <a:pt x="2054781" y="2053228"/>
-                </a:cubicBezTo>
-                <a:cubicBezTo>
-                  <a:pt x="2024011" y="2067487"/>
-                  <a:pt x="1976984" y="2073824"/>
-                  <a:pt x="1985693" y="2109207"/>
-                </a:cubicBezTo>
-                <a:cubicBezTo>
-                  <a:pt x="1992660" y="2137196"/>
-                  <a:pt x="2032140" y="2133500"/>
-                  <a:pt x="2061168" y="2130859"/>
-                </a:cubicBezTo>
-                <a:cubicBezTo>
-                  <a:pt x="2172636" y="2120825"/>
-                  <a:pt x="2281202" y="2117656"/>
-                  <a:pt x="2388026" y="2184726"/>
-                </a:cubicBezTo>
-                <a:cubicBezTo>
-                  <a:pt x="2116321" y="2282425"/>
-                  <a:pt x="1803977" y="2241233"/>
-                  <a:pt x="1560719" y="2384876"/>
-                </a:cubicBezTo>
-                <a:cubicBezTo>
-                  <a:pt x="1594973" y="2429237"/>
-                  <a:pt x="1643739" y="2405472"/>
-                  <a:pt x="1679734" y="2400191"/>
-                </a:cubicBezTo>
-                <a:cubicBezTo>
-                  <a:pt x="1916026" y="2364279"/>
-                  <a:pt x="2760170" y="2428180"/>
-                  <a:pt x="2882089" y="2383292"/>
-                </a:cubicBezTo>
-                <a:cubicBezTo>
-                  <a:pt x="2956983" y="2355830"/>
-                  <a:pt x="3035941" y="2342628"/>
-                  <a:pt x="3116638" y="2359528"/>
-                </a:cubicBezTo>
-                <a:cubicBezTo>
-                  <a:pt x="3194434" y="2375898"/>
-                  <a:pt x="3174696" y="2605622"/>
-                  <a:pt x="2897765" y="2758243"/>
-                </a:cubicBezTo>
-                <a:cubicBezTo>
-                  <a:pt x="2858286" y="2779895"/>
-                  <a:pt x="3034779" y="2811053"/>
-                  <a:pt x="2981367" y="2829008"/>
-                </a:cubicBezTo>
-                <a:cubicBezTo>
-                  <a:pt x="2939566" y="2843267"/>
-                  <a:pt x="2734626" y="2835346"/>
-                  <a:pt x="2682955" y="2846436"/>
-                </a:cubicBezTo>
-                <a:cubicBezTo>
-                  <a:pt x="2662635" y="2851188"/>
-                  <a:pt x="2040267" y="3029159"/>
-                  <a:pt x="2099485" y="3066653"/>
-                </a:cubicBezTo>
-                <a:cubicBezTo>
-                  <a:pt x="2276558" y="3179139"/>
-                  <a:pt x="2869897" y="3385098"/>
-                  <a:pt x="1807460" y="3454808"/>
-                </a:cubicBezTo>
-                <a:cubicBezTo>
-                  <a:pt x="1841132" y="3495472"/>
-                  <a:pt x="1934024" y="3469596"/>
-                  <a:pt x="1921251" y="3540889"/>
-                </a:cubicBezTo>
-                <a:cubicBezTo>
-                  <a:pt x="1780173" y="3579440"/>
-                  <a:pt x="1617035" y="3577328"/>
-                  <a:pt x="1453313" y="3637002"/>
-                </a:cubicBezTo>
-                <a:cubicBezTo>
-                  <a:pt x="1527047" y="3680307"/>
-                  <a:pt x="1611808" y="3653902"/>
-                  <a:pt x="1686122" y="3667634"/>
-                </a:cubicBezTo>
-                <a:cubicBezTo>
-                  <a:pt x="1644320" y="3722027"/>
-                  <a:pt x="1572330" y="3713578"/>
-                  <a:pt x="1513692" y="3725196"/>
-                </a:cubicBezTo>
-                <a:cubicBezTo>
-                  <a:pt x="1459700" y="3736286"/>
-                  <a:pt x="1345329" y="3830816"/>
-                  <a:pt x="1369711" y="3826063"/>
-                </a:cubicBezTo>
-                <a:cubicBezTo>
-                  <a:pt x="1595553" y="3783815"/>
-                  <a:pt x="1824877" y="3795434"/>
-                  <a:pt x="2051298" y="3754242"/>
-                </a:cubicBezTo>
-                <a:cubicBezTo>
-                  <a:pt x="2126192" y="3740511"/>
-                  <a:pt x="2210955" y="3714106"/>
-                  <a:pt x="2245207" y="3797018"/>
-                </a:cubicBezTo>
-                <a:cubicBezTo>
-                  <a:pt x="2255659" y="3821310"/>
-                  <a:pt x="2248109" y="3829232"/>
-                  <a:pt x="2353192" y="3796489"/>
-                </a:cubicBezTo>
-                <a:cubicBezTo>
-                  <a:pt x="2394414" y="3783815"/>
-                  <a:pt x="2448988" y="3770085"/>
-                  <a:pt x="2490207" y="3801242"/>
-                </a:cubicBezTo>
-                <a:cubicBezTo>
-                  <a:pt x="2464082" y="3840321"/>
-                  <a:pt x="2413572" y="3828703"/>
-                  <a:pt x="2375835" y="3839794"/>
-                </a:cubicBezTo>
-                <a:cubicBezTo>
-                  <a:pt x="2275978" y="3868311"/>
-                  <a:pt x="2619094" y="3977100"/>
-                  <a:pt x="2522138" y="4009841"/>
-                </a:cubicBezTo>
-                <a:cubicBezTo>
-                  <a:pt x="2323584" y="4076912"/>
-                  <a:pt x="2199343" y="4057372"/>
-                  <a:pt x="1998466" y="4130778"/>
-                </a:cubicBezTo>
-                <a:cubicBezTo>
-                  <a:pt x="2066973" y="4129192"/>
-                  <a:pt x="2046072" y="4154543"/>
-                  <a:pt x="2114580" y="4154543"/>
-                </a:cubicBezTo>
-                <a:cubicBezTo>
-                  <a:pt x="2145350" y="4154543"/>
-                  <a:pt x="2177862" y="4160878"/>
-                  <a:pt x="2177862" y="4189925"/>
-                </a:cubicBezTo>
-                <a:cubicBezTo>
-                  <a:pt x="2177862" y="4217385"/>
-                  <a:pt x="1817330" y="4367895"/>
-                  <a:pt x="1868419" y="4382153"/>
-                </a:cubicBezTo>
-                <a:cubicBezTo>
-                  <a:pt x="2007755" y="4420704"/>
-                  <a:pt x="2365385" y="4302410"/>
-                  <a:pt x="2279460" y="4356805"/>
-                </a:cubicBezTo>
-                <a:cubicBezTo>
-                  <a:pt x="2148834" y="4439716"/>
-                  <a:pt x="2129094" y="4456088"/>
-                  <a:pt x="2029817" y="4468235"/>
-                </a:cubicBezTo>
-                <a:cubicBezTo>
-                  <a:pt x="1944474" y="4478796"/>
-                  <a:pt x="1644320" y="4710633"/>
-                  <a:pt x="1560137" y="4730172"/>
-                </a:cubicBezTo>
-                <a:cubicBezTo>
-                  <a:pt x="1485825" y="4747072"/>
-                  <a:pt x="1774947" y="4800410"/>
-                  <a:pt x="1956664" y="4820477"/>
-                </a:cubicBezTo>
-                <a:cubicBezTo>
-                  <a:pt x="2130256" y="4840017"/>
-                  <a:pt x="3101544" y="4789319"/>
-                  <a:pt x="3268168" y="4852692"/>
-                </a:cubicBezTo>
-                <a:cubicBezTo>
-                  <a:pt x="3111993" y="4878041"/>
-                  <a:pt x="2970336" y="4953030"/>
-                  <a:pt x="2807197" y="4939300"/>
-                </a:cubicBezTo>
-                <a:cubicBezTo>
-                  <a:pt x="2773524" y="4936660"/>
-                  <a:pt x="2724756" y="4930323"/>
-                  <a:pt x="2721272" y="4970458"/>
-                </a:cubicBezTo>
-                <a:cubicBezTo>
-                  <a:pt x="2718369" y="5005313"/>
-                  <a:pt x="2788038" y="4981548"/>
-                  <a:pt x="2802552" y="5014291"/>
-                </a:cubicBezTo>
-                <a:cubicBezTo>
-                  <a:pt x="2719531" y="5060235"/>
-                  <a:pt x="2621415" y="5018515"/>
-                  <a:pt x="2537812" y="5053898"/>
-                </a:cubicBezTo>
-                <a:cubicBezTo>
-                  <a:pt x="2491948" y="5099314"/>
-                  <a:pt x="2589483" y="5107236"/>
-                  <a:pt x="2569744" y="5153182"/>
-                </a:cubicBezTo>
-                <a:cubicBezTo>
-                  <a:pt x="2301522" y="5193845"/>
-                  <a:pt x="2252174" y="5268836"/>
-                  <a:pt x="1987436" y="5334320"/>
-                </a:cubicBezTo>
-                <a:cubicBezTo>
-                  <a:pt x="1971179" y="5338545"/>
-                  <a:pt x="1958407" y="5352274"/>
-                  <a:pt x="1972921" y="5382376"/>
-                </a:cubicBezTo>
-                <a:cubicBezTo>
-                  <a:pt x="2087874" y="5396107"/>
-                  <a:pt x="2215599" y="5373399"/>
-                  <a:pt x="2341001" y="5360725"/>
-                </a:cubicBezTo>
-                <a:cubicBezTo>
-                  <a:pt x="2537812" y="5340129"/>
-                  <a:pt x="2533748" y="5339072"/>
-                  <a:pt x="2710822" y="5418816"/>
-                </a:cubicBezTo>
-                <a:cubicBezTo>
-                  <a:pt x="2743914" y="5433602"/>
-                  <a:pt x="2801390" y="5438355"/>
-                  <a:pt x="2833903" y="5413007"/>
-                </a:cubicBezTo>
-                <a:cubicBezTo>
-                  <a:pt x="2896604" y="5364422"/>
-                  <a:pt x="2950016" y="5368646"/>
-                  <a:pt x="3011556" y="5399276"/>
-                </a:cubicBezTo>
-                <a:cubicBezTo>
-                  <a:pt x="3077160" y="5432547"/>
-                  <a:pt x="3171793" y="5391882"/>
-                  <a:pt x="3254233" y="5439412"/>
-                </a:cubicBezTo>
-                <a:cubicBezTo>
-                  <a:pt x="3099802" y="5473739"/>
-                  <a:pt x="2957563" y="5473739"/>
-                  <a:pt x="2792101" y="5471625"/>
-                </a:cubicBezTo>
-                <a:cubicBezTo>
-                  <a:pt x="2846095" y="5537639"/>
-                  <a:pt x="2914601" y="5536582"/>
-                  <a:pt x="2977303" y="5539751"/>
-                </a:cubicBezTo>
-                <a:cubicBezTo>
-                  <a:pt x="3214174" y="5551898"/>
-                  <a:pt x="3601411" y="5660686"/>
-                  <a:pt x="3656566" y="5678642"/>
-                </a:cubicBezTo>
-                <a:cubicBezTo>
-                  <a:pt x="4280675" y="5879847"/>
-                  <a:pt x="4178497" y="5898332"/>
-                  <a:pt x="4858340" y="5969625"/>
-                </a:cubicBezTo>
-                <a:cubicBezTo>
-                  <a:pt x="5261253" y="6011873"/>
-                  <a:pt x="4887368" y="6032469"/>
-                  <a:pt x="5296668" y="6043559"/>
-                </a:cubicBezTo>
-                <a:cubicBezTo>
-                  <a:pt x="5349500" y="6045143"/>
-                  <a:pt x="5402911" y="6044087"/>
-                  <a:pt x="5456323" y="6042502"/>
-                </a:cubicBezTo>
-                <a:cubicBezTo>
-                  <a:pt x="5368077" y="6073134"/>
-                  <a:pt x="5267058" y="6100066"/>
-                  <a:pt x="5267058" y="6100066"/>
-                </a:cubicBezTo>
-                <a:cubicBezTo>
-                  <a:pt x="5267058" y="6100066"/>
-                  <a:pt x="5318728" y="6208854"/>
-                  <a:pt x="7095266" y="6287541"/>
-                </a:cubicBezTo>
-                <a:cubicBezTo>
-                  <a:pt x="7422124" y="6302329"/>
-                  <a:pt x="9563254" y="6024548"/>
-                  <a:pt x="9707235" y="5994446"/>
-                </a:cubicBezTo>
-                <a:cubicBezTo>
-                  <a:pt x="9844249" y="5966984"/>
-                  <a:pt x="10002164" y="5671247"/>
-                  <a:pt x="10083442" y="5678642"/>
-                </a:cubicBezTo>
-                <a:cubicBezTo>
-                  <a:pt x="10103183" y="5653293"/>
-                  <a:pt x="10283158" y="5139979"/>
-                  <a:pt x="10338892" y="4650957"/>
-                </a:cubicBezTo>
-                <a:cubicBezTo>
-                  <a:pt x="10448618" y="4580718"/>
-                  <a:pt x="10551960" y="4503088"/>
-                  <a:pt x="10628013" y="4411198"/>
-                </a:cubicBezTo>
-                <a:cubicBezTo>
-                  <a:pt x="10675040" y="4354692"/>
-                  <a:pt x="10718003" y="4298185"/>
-                  <a:pt x="10802766" y="4258050"/>
-                </a:cubicBezTo>
-                <a:cubicBezTo>
-                  <a:pt x="10755739" y="4203128"/>
-                  <a:pt x="10675040" y="4190453"/>
-                  <a:pt x="10614662" y="4150318"/>
-                </a:cubicBezTo>
-                <a:cubicBezTo>
-                  <a:pt x="10610017" y="4117046"/>
-                  <a:pt x="10705811" y="4127081"/>
-                  <a:pt x="10681427" y="4054203"/>
-                </a:cubicBezTo>
-                <a:cubicBezTo>
-                  <a:pt x="10648335" y="3957032"/>
-                  <a:pt x="10684328" y="3846131"/>
-                  <a:pt x="10520029" y="3804411"/>
-                </a:cubicBezTo>
-                <a:cubicBezTo>
-                  <a:pt x="10476485" y="3709881"/>
-                  <a:pt x="10464294" y="3558845"/>
-                  <a:pt x="10568798" y="3466426"/>
-                </a:cubicBezTo>
-                <a:cubicBezTo>
-                  <a:pt x="10724388" y="3328592"/>
-                  <a:pt x="10699424" y="3240927"/>
-                  <a:pt x="10499709" y="3166465"/>
-                </a:cubicBezTo>
-                <a:cubicBezTo>
-                  <a:pt x="10474164" y="3156958"/>
-                  <a:pt x="10501452" y="2570768"/>
-                  <a:pt x="10489840" y="2546475"/>
-                </a:cubicBezTo>
-                <a:cubicBezTo>
-                  <a:pt x="10508418" y="2513205"/>
-                  <a:pt x="10551960" y="2521126"/>
-                  <a:pt x="10584471" y="2512148"/>
-                </a:cubicBezTo>
-                <a:cubicBezTo>
-                  <a:pt x="10726711" y="2474125"/>
-                  <a:pt x="10731357" y="2474125"/>
-                  <a:pt x="10695942" y="2358471"/>
-                </a:cubicBezTo>
-                <a:cubicBezTo>
-                  <a:pt x="10685490" y="2323616"/>
-                  <a:pt x="10709874" y="2309357"/>
-                  <a:pt x="10732516" y="2287706"/>
-                </a:cubicBezTo>
-                <a:cubicBezTo>
-                  <a:pt x="10817280" y="2206905"/>
-                  <a:pt x="10817860" y="2205850"/>
-                  <a:pt x="10731357" y="2137725"/>
-                </a:cubicBezTo>
-                <a:cubicBezTo>
-                  <a:pt x="10706391" y="2118185"/>
-                  <a:pt x="10689555" y="2097061"/>
-                  <a:pt x="10678525" y="2070656"/>
-                </a:cubicBezTo>
-                <a:cubicBezTo>
-                  <a:pt x="10658203" y="2022599"/>
-                  <a:pt x="10658784" y="1982463"/>
-                  <a:pt x="10735999" y="1956587"/>
-                </a:cubicBezTo>
-                <a:cubicBezTo>
-                  <a:pt x="10789993" y="1938104"/>
-                  <a:pt x="10820762" y="1916978"/>
-                  <a:pt x="10824246" y="1862584"/>
-                </a:cubicBezTo>
-                <a:cubicBezTo>
-                  <a:pt x="10826570" y="1817166"/>
-                  <a:pt x="10832955" y="1787594"/>
-                  <a:pt x="10773156" y="1768054"/>
-                </a:cubicBezTo>
-                <a:cubicBezTo>
-                  <a:pt x="10724969" y="1752211"/>
-                  <a:pt x="10711036" y="1718412"/>
-                  <a:pt x="10716261" y="1678278"/>
-                </a:cubicBezTo>
-                <a:cubicBezTo>
-                  <a:pt x="10728452" y="1580050"/>
-                  <a:pt x="10662849" y="1522487"/>
-                  <a:pt x="10554864" y="1477599"/>
-                </a:cubicBezTo>
-                <a:cubicBezTo>
-                  <a:pt x="10452101" y="1434822"/>
-                  <a:pt x="10362116" y="1377259"/>
-                  <a:pt x="10267483" y="1324977"/>
-                </a:cubicBezTo>
-                <a:cubicBezTo>
-                  <a:pt x="10162399" y="1266887"/>
-                  <a:pt x="10040481" y="1232031"/>
-                  <a:pt x="9913337" y="1202458"/>
-                </a:cubicBezTo>
-                <a:cubicBezTo>
-                  <a:pt x="9936561" y="1160210"/>
-                  <a:pt x="10016678" y="1183974"/>
-                  <a:pt x="10024805" y="1124827"/>
-                </a:cubicBezTo>
-                <a:cubicBezTo>
-                  <a:pt x="9826251" y="1074658"/>
-                  <a:pt x="9636408" y="999139"/>
-                  <a:pt x="9411726" y="980655"/>
-                </a:cubicBezTo>
-                <a:cubicBezTo>
-                  <a:pt x="9593444" y="990161"/>
-                  <a:pt x="9758326" y="922036"/>
-                  <a:pt x="9930753" y="901968"/>
-                </a:cubicBezTo>
-                <a:cubicBezTo>
-                  <a:pt x="9947008" y="868698"/>
-                  <a:pt x="9909273" y="877147"/>
-                  <a:pt x="9894178" y="871339"/>
-                </a:cubicBezTo>
-                <a:cubicBezTo>
-                  <a:pt x="9879083" y="865001"/>
-                  <a:pt x="9860506" y="862889"/>
-                  <a:pt x="9858182" y="839125"/>
-                </a:cubicBezTo>
-                <a:cubicBezTo>
-                  <a:pt x="9941205" y="804798"/>
-                  <a:pt x="10045126" y="827506"/>
-                  <a:pt x="10131050" y="792652"/>
-                </a:cubicBezTo>
-                <a:cubicBezTo>
-                  <a:pt x="10111891" y="741954"/>
-                  <a:pt x="10037578" y="772583"/>
-                  <a:pt x="10006808" y="731920"/>
-                </a:cubicBezTo>
-                <a:cubicBezTo>
-                  <a:pt x="10086927" y="724526"/>
-                  <a:pt x="10161239" y="721357"/>
-                  <a:pt x="10233809" y="710268"/>
-                </a:cubicBezTo>
-                <a:cubicBezTo>
-                  <a:pt x="10290705" y="701818"/>
-                  <a:pt x="10306380" y="658513"/>
-                  <a:pt x="10267483" y="628940"/>
-                </a:cubicBezTo>
-                <a:cubicBezTo>
-                  <a:pt x="10232648" y="602536"/>
-                  <a:pt x="10181559" y="600422"/>
-                  <a:pt x="10136275" y="589333"/>
-                </a:cubicBezTo>
-                <a:cubicBezTo>
-                  <a:pt x="9813479" y="512230"/>
-                  <a:pt x="9474428" y="487409"/>
-                  <a:pt x="9131312" y="480544"/>
-                </a:cubicBezTo>
-                <a:cubicBezTo>
-                  <a:pt x="8580936" y="469453"/>
-                  <a:pt x="8028817" y="469982"/>
-                  <a:pt x="7479600" y="454667"/>
-                </a:cubicBezTo>
-                <a:cubicBezTo>
-                  <a:pt x="7227489" y="447934"/>
-                  <a:pt x="6976357" y="436744"/>
-                  <a:pt x="6724001" y="434021"/>
-                </a:cubicBezTo>
-                <a:close/>
-                <a:moveTo>
-                  <a:pt x="0" y="0"/>
+                  <a:pt x="1503712" y="0"/>
                 </a:moveTo>
                 <a:lnTo>
-                  <a:pt x="12192000" y="0"/>
+                  <a:pt x="7767094" y="0"/>
                 </a:lnTo>
                 <a:lnTo>
-                  <a:pt x="12192000" y="6858000"/>
+                  <a:pt x="7913128" y="139721"/>
+                </a:lnTo>
+                <a:cubicBezTo>
+                  <a:pt x="8751971" y="981521"/>
+                  <a:pt x="9270806" y="2144457"/>
+                  <a:pt x="9270806" y="3429000"/>
+                </a:cubicBezTo>
+                <a:cubicBezTo>
+                  <a:pt x="9270806" y="4713544"/>
+                  <a:pt x="8751971" y="5876479"/>
+                  <a:pt x="7913128" y="6718279"/>
+                </a:cubicBezTo>
+                <a:lnTo>
+                  <a:pt x="7767094" y="6858000"/>
                 </a:lnTo>
                 <a:lnTo>
-                  <a:pt x="0" y="6858000"/>
+                  <a:pt x="1503712" y="6858000"/>
                 </a:lnTo>
+                <a:lnTo>
+                  <a:pt x="1357679" y="6718279"/>
+                </a:lnTo>
+                <a:cubicBezTo>
+                  <a:pt x="518835" y="5876479"/>
+                  <a:pt x="0" y="4713544"/>
+                  <a:pt x="0" y="3429000"/>
+                </a:cubicBezTo>
+                <a:cubicBezTo>
+                  <a:pt x="0" y="2144457"/>
+                  <a:pt x="518835" y="981521"/>
+                  <a:pt x="1357679" y="139721"/>
+                </a:cubicBezTo>
                 <a:close/>
               </a:path>
             </a:pathLst>
           </a:custGeom>
-          <a:solidFill>
-            <a:schemeClr val="bg2">
-              <a:alpha val="50000"/>
-            </a:schemeClr>
-          </a:solidFill>
-          <a:ln w="32707" cap="flat">
-            <a:noFill/>
-            <a:prstDash val="solid"/>
-            <a:miter/>
-          </a:ln>
         </p:spPr>
-        <p:txBody>
-          <a:bodyPr wrap="square" rtlCol="0" anchor="ctr">
-            <a:noAutofit/>
-          </a:bodyPr>
-          <a:lstStyle/>
-          <a:p>
-            <a:pPr algn="ctr"/>
-            <a:endParaRPr lang="en-US"/>
-          </a:p>
-        </p:txBody>
-      </p:sp>
-      <p:sp>
-        <p:nvSpPr>
-          <p:cNvPr id="2" name="TextBox 1">
-            <a:extLst>
-              <a:ext uri="{FF2B5EF4-FFF2-40B4-BE49-F238E27FC236}">
-                <a16:creationId xmlns:a16="http://schemas.microsoft.com/office/drawing/2014/main" id="{6615451D-733A-6113-B25B-ABB1053BD8DE}"/>
-              </a:ext>
-            </a:extLst>
-          </p:cNvPr>
-          <p:cNvSpPr txBox="1"/>
-          <p:nvPr/>
-        </p:nvSpPr>
-        <p:spPr>
-          <a:xfrm>
-            <a:off x="2518610" y="1905506"/>
-            <a:ext cx="7154779" cy="3046988"/>
-          </a:xfrm>
-          <a:prstGeom prst="rect">
-            <a:avLst/>
-          </a:prstGeom>
-          <a:noFill/>
-        </p:spPr>
-        <p:txBody>
-          <a:bodyPr wrap="square" rtlCol="0">
-            <a:spAutoFit/>
-          </a:bodyPr>
-          <a:lstStyle/>
-          <a:p>
-            <a:pPr algn="ctr"/>
-            <a:r>
-              <a:rPr lang="en-IN" sz="3200" dirty="0">
-                <a:latin typeface="Cascadia Code" panose="020B0609020000020004" pitchFamily="49" charset="0"/>
-                <a:ea typeface="Cascadia Code" panose="020B0609020000020004" pitchFamily="49" charset="0"/>
-                <a:cs typeface="Cascadia Code" panose="020B0609020000020004" pitchFamily="49" charset="0"/>
-              </a:rPr>
-              <a:t>In the approach, the time complexity is O(N^3) &amp; Space is O(N). So, I got </a:t>
-            </a:r>
-            <a:r>
-              <a:rPr lang="en-US" sz="3200" b="0" i="0" u="none" strike="noStrike" dirty="0">
-                <a:solidFill>
-                  <a:srgbClr val="C62928"/>
-                </a:solidFill>
-                <a:effectLst/>
-                <a:latin typeface="-apple-system"/>
-              </a:rPr>
-              <a:t>Time Limit Exceeded. </a:t>
-            </a:r>
-            <a:r>
-              <a:rPr lang="en-IN" sz="3200" dirty="0">
-                <a:latin typeface="Cascadia Code" panose="020B0609020000020004" pitchFamily="49" charset="0"/>
-                <a:ea typeface="Cascadia Code" panose="020B0609020000020004" pitchFamily="49" charset="0"/>
-                <a:cs typeface="Cascadia Code" panose="020B0609020000020004" pitchFamily="49" charset="0"/>
-              </a:rPr>
-              <a:t>Now, We can further optimise the time, with dynamic programming.</a:t>
-            </a:r>
-            <a:endParaRPr lang="en-US" sz="3200" dirty="0">
-              <a:latin typeface="Cascadia Code" panose="020B0609020000020004" pitchFamily="49" charset="0"/>
-              <a:ea typeface="Cascadia Code" panose="020B0609020000020004" pitchFamily="49" charset="0"/>
-              <a:cs typeface="Cascadia Code" panose="020B0609020000020004" pitchFamily="49" charset="0"/>
-            </a:endParaRPr>
-          </a:p>
-        </p:txBody>
-      </p:sp>
+      </p:pic>
     </p:spTree>
     <p:extLst>
       <p:ext uri="{BB962C8B-B14F-4D97-AF65-F5344CB8AC3E}">
-        <p14:creationId xmlns:p14="http://schemas.microsoft.com/office/powerpoint/2010/main" val="3855765863"/>
+        <p14:creationId xmlns:p14="http://schemas.microsoft.com/office/powerpoint/2010/main" val="430150153"/>
       </p:ext>
     </p:extLst>
   </p:cSld>
@@ -6019,73 +5063,7 @@
 </p:sld>
 </file>
 
-<file path=ppt/slides/slide5.xml><?xml version="1.0" encoding="utf-8"?>
-<p:sld xmlns:a="http://schemas.openxmlformats.org/drawingml/2006/main" xmlns:r="http://schemas.openxmlformats.org/officeDocument/2006/relationships" xmlns:p="http://schemas.openxmlformats.org/presentationml/2006/main">
-  <p:cSld>
-    <p:spTree>
-      <p:nvGrpSpPr>
-        <p:cNvPr id="1" name=""/>
-        <p:cNvGrpSpPr/>
-        <p:nvPr/>
-      </p:nvGrpSpPr>
-      <p:grpSpPr>
-        <a:xfrm>
-          <a:off x="0" y="0"/>
-          <a:ext cx="0" cy="0"/>
-          <a:chOff x="0" y="0"/>
-          <a:chExt cx="0" cy="0"/>
-        </a:xfrm>
-      </p:grpSpPr>
-      <p:pic>
-        <p:nvPicPr>
-          <p:cNvPr id="3" name="Picture 2" descr="Text&#10;&#10;Description automatically generated">
-            <a:extLst>
-              <a:ext uri="{FF2B5EF4-FFF2-40B4-BE49-F238E27FC236}">
-                <a16:creationId xmlns:a16="http://schemas.microsoft.com/office/drawing/2014/main" id="{2550DC88-4018-9C6C-182F-7FC4C99930A4}"/>
-              </a:ext>
-            </a:extLst>
-          </p:cNvPr>
-          <p:cNvPicPr>
-            <a:picLocks noChangeAspect="1"/>
-          </p:cNvPicPr>
-          <p:nvPr/>
-        </p:nvPicPr>
-        <p:blipFill>
-          <a:blip r:embed="rId2">
-            <a:extLst>
-              <a:ext uri="{28A0092B-C50C-407E-A947-70E740481C1C}">
-                <a14:useLocalDpi xmlns:a14="http://schemas.microsoft.com/office/drawing/2010/main" val="0"/>
-              </a:ext>
-            </a:extLst>
-          </a:blip>
-          <a:stretch>
-            <a:fillRect/>
-          </a:stretch>
-        </p:blipFill>
-        <p:spPr>
-          <a:xfrm>
-            <a:off x="2160309" y="0"/>
-            <a:ext cx="7871381" cy="6858000"/>
-          </a:xfrm>
-          <a:prstGeom prst="rect">
-            <a:avLst/>
-          </a:prstGeom>
-        </p:spPr>
-      </p:pic>
-    </p:spTree>
-    <p:extLst>
-      <p:ext uri="{BB962C8B-B14F-4D97-AF65-F5344CB8AC3E}">
-        <p14:creationId xmlns:p14="http://schemas.microsoft.com/office/powerpoint/2010/main" val="467510242"/>
-      </p:ext>
-    </p:extLst>
-  </p:cSld>
-  <p:clrMapOvr>
-    <a:masterClrMapping/>
-  </p:clrMapOvr>
-</p:sld>
-</file>
-
-<file path=ppt/slides/slide6.xml><?xml version="1.0" encoding="utf-8"?>
+<file path=ppt/slides/slide4.xml><?xml version="1.0" encoding="utf-8"?>
 <p:sld xmlns:a="http://schemas.openxmlformats.org/drawingml/2006/main" xmlns:r="http://schemas.openxmlformats.org/officeDocument/2006/relationships" xmlns:p="http://schemas.openxmlformats.org/presentationml/2006/main">
   <p:cSld>
     <p:bg>

</xml_diff>